<commit_message>
lec2, 3 ppt updated
</commit_message>
<xml_diff>
--- a/lectures/lec3_processes.pptx
+++ b/lectures/lec3_processes.pptx
@@ -2,63 +2,62 @@
 <file path=ppt/presentation.xml><?xml version="1.0" encoding="utf-8"?>
 <p:presentation xmlns:a="http://schemas.openxmlformats.org/drawingml/2006/main" xmlns:r="http://schemas.openxmlformats.org/officeDocument/2006/relationships" xmlns:p="http://schemas.openxmlformats.org/presentationml/2006/main" showSpecialPlsOnTitleSld="0" saveSubsetFonts="1" autoCompressPictures="0">
   <p:sldMasterIdLst>
-    <p:sldMasterId id="2147483772" r:id="rId1"/>
-    <p:sldMasterId id="2147483777" r:id="rId2"/>
+    <p:sldMasterId id="2147483781" r:id="rId1"/>
   </p:sldMasterIdLst>
   <p:notesMasterIdLst>
-    <p:notesMasterId r:id="rId50"/>
+    <p:notesMasterId r:id="rId49"/>
   </p:notesMasterIdLst>
   <p:handoutMasterIdLst>
-    <p:handoutMasterId r:id="rId51"/>
+    <p:handoutMasterId r:id="rId50"/>
   </p:handoutMasterIdLst>
   <p:sldIdLst>
-    <p:sldId id="2991" r:id="rId3"/>
-    <p:sldId id="349" r:id="rId4"/>
-    <p:sldId id="350" r:id="rId5"/>
-    <p:sldId id="351" r:id="rId6"/>
-    <p:sldId id="353" r:id="rId7"/>
-    <p:sldId id="354" r:id="rId8"/>
-    <p:sldId id="355" r:id="rId9"/>
-    <p:sldId id="357" r:id="rId10"/>
-    <p:sldId id="358" r:id="rId11"/>
-    <p:sldId id="359" r:id="rId12"/>
-    <p:sldId id="356" r:id="rId13"/>
-    <p:sldId id="360" r:id="rId14"/>
-    <p:sldId id="361" r:id="rId15"/>
-    <p:sldId id="362" r:id="rId16"/>
-    <p:sldId id="363" r:id="rId17"/>
-    <p:sldId id="365" r:id="rId18"/>
-    <p:sldId id="366" r:id="rId19"/>
-    <p:sldId id="368" r:id="rId20"/>
-    <p:sldId id="369" r:id="rId21"/>
-    <p:sldId id="370" r:id="rId22"/>
-    <p:sldId id="371" r:id="rId23"/>
-    <p:sldId id="372" r:id="rId24"/>
-    <p:sldId id="373" r:id="rId25"/>
-    <p:sldId id="374" r:id="rId26"/>
-    <p:sldId id="375" r:id="rId27"/>
-    <p:sldId id="376" r:id="rId28"/>
-    <p:sldId id="377" r:id="rId29"/>
-    <p:sldId id="378" r:id="rId30"/>
-    <p:sldId id="364" r:id="rId31"/>
-    <p:sldId id="379" r:id="rId32"/>
-    <p:sldId id="2993" r:id="rId33"/>
-    <p:sldId id="381" r:id="rId34"/>
-    <p:sldId id="382" r:id="rId35"/>
-    <p:sldId id="383" r:id="rId36"/>
-    <p:sldId id="384" r:id="rId37"/>
-    <p:sldId id="2992" r:id="rId38"/>
-    <p:sldId id="385" r:id="rId39"/>
-    <p:sldId id="386" r:id="rId40"/>
-    <p:sldId id="396" r:id="rId41"/>
-    <p:sldId id="397" r:id="rId42"/>
-    <p:sldId id="387" r:id="rId43"/>
-    <p:sldId id="399" r:id="rId44"/>
-    <p:sldId id="388" r:id="rId45"/>
-    <p:sldId id="389" r:id="rId46"/>
-    <p:sldId id="390" r:id="rId47"/>
-    <p:sldId id="394" r:id="rId48"/>
-    <p:sldId id="395" r:id="rId49"/>
+    <p:sldId id="2990" r:id="rId2"/>
+    <p:sldId id="349" r:id="rId3"/>
+    <p:sldId id="350" r:id="rId4"/>
+    <p:sldId id="351" r:id="rId5"/>
+    <p:sldId id="353" r:id="rId6"/>
+    <p:sldId id="354" r:id="rId7"/>
+    <p:sldId id="355" r:id="rId8"/>
+    <p:sldId id="357" r:id="rId9"/>
+    <p:sldId id="358" r:id="rId10"/>
+    <p:sldId id="359" r:id="rId11"/>
+    <p:sldId id="356" r:id="rId12"/>
+    <p:sldId id="360" r:id="rId13"/>
+    <p:sldId id="361" r:id="rId14"/>
+    <p:sldId id="362" r:id="rId15"/>
+    <p:sldId id="363" r:id="rId16"/>
+    <p:sldId id="365" r:id="rId17"/>
+    <p:sldId id="366" r:id="rId18"/>
+    <p:sldId id="368" r:id="rId19"/>
+    <p:sldId id="369" r:id="rId20"/>
+    <p:sldId id="370" r:id="rId21"/>
+    <p:sldId id="371" r:id="rId22"/>
+    <p:sldId id="372" r:id="rId23"/>
+    <p:sldId id="373" r:id="rId24"/>
+    <p:sldId id="374" r:id="rId25"/>
+    <p:sldId id="375" r:id="rId26"/>
+    <p:sldId id="376" r:id="rId27"/>
+    <p:sldId id="377" r:id="rId28"/>
+    <p:sldId id="378" r:id="rId29"/>
+    <p:sldId id="364" r:id="rId30"/>
+    <p:sldId id="379" r:id="rId31"/>
+    <p:sldId id="2993" r:id="rId32"/>
+    <p:sldId id="381" r:id="rId33"/>
+    <p:sldId id="382" r:id="rId34"/>
+    <p:sldId id="383" r:id="rId35"/>
+    <p:sldId id="384" r:id="rId36"/>
+    <p:sldId id="2992" r:id="rId37"/>
+    <p:sldId id="385" r:id="rId38"/>
+    <p:sldId id="386" r:id="rId39"/>
+    <p:sldId id="396" r:id="rId40"/>
+    <p:sldId id="397" r:id="rId41"/>
+    <p:sldId id="387" r:id="rId42"/>
+    <p:sldId id="399" r:id="rId43"/>
+    <p:sldId id="388" r:id="rId44"/>
+    <p:sldId id="389" r:id="rId45"/>
+    <p:sldId id="390" r:id="rId46"/>
+    <p:sldId id="394" r:id="rId47"/>
+    <p:sldId id="395" r:id="rId48"/>
   </p:sldIdLst>
   <p:sldSz cx="9144000" cy="6858000" type="screen4x3"/>
   <p:notesSz cx="6858000" cy="9144000"/>
@@ -259,7 +258,7 @@
             <a:fld id="{3B85FA19-4AE7-394C-8E06-B4A0FB3E5AA8}" type="datetimeFigureOut">
               <a:rPr lang="en-US" smtClean="0"/>
               <a:pPr/>
-              <a:t>9/6/24</a:t>
+              <a:t>9/11/24</a:t>
             </a:fld>
             <a:endParaRPr lang="en-US"/>
           </a:p>
@@ -427,7 +426,7 @@
             <a:fld id="{FD6991A4-6061-8E40-B3BF-9224535D7C20}" type="datetimeFigureOut">
               <a:rPr lang="en-US" smtClean="0"/>
               <a:pPr/>
-              <a:t>9/6/24</a:t>
+              <a:t>9/11/24</a:t>
             </a:fld>
             <a:endParaRPr lang="en-US"/>
           </a:p>
@@ -1852,11 +1851,7 @@
             <a:off x="685800" y="1772816"/>
             <a:ext cx="7772400" cy="1542033"/>
           </a:xfrm>
-          <a:effectLst>
-            <a:outerShdw dist="17780" dir="2700000" algn="ctr" rotWithShape="0">
-              <a:srgbClr val="000000"/>
-            </a:outerShdw>
-          </a:effectLst>
+          <a:effectLst/>
         </p:spPr>
         <p:txBody>
           <a:bodyPr/>
@@ -1868,21 +1863,20 @@
               <a:spcAft>
                 <a:spcPct val="0"/>
               </a:spcAft>
-              <a:defRPr kumimoji="1" lang="ko-KR" altLang="en-US" sz="4400" b="1" kern="1200" dirty="0">
-                <a:solidFill>
-                  <a:schemeClr val="tx2">
+              <a:defRPr lang="ko-KR" altLang="en-US" sz="4000" b="1" dirty="0">
+                <a:solidFill>
+                  <a:schemeClr val="accent1">
                     <a:lumMod val="75000"/>
                   </a:schemeClr>
                 </a:solidFill>
-                <a:latin typeface="Adobe 고딕 Std B" pitchFamily="34" charset="-127"/>
-                <a:ea typeface="Adobe 고딕 Std B" pitchFamily="34" charset="-127"/>
-                <a:cs typeface="Adobe Arabic" pitchFamily="18" charset="-78"/>
+                <a:latin typeface="Helvetica Neue" panose="02000503000000020004" pitchFamily="2" charset="0"/>
+                <a:cs typeface="Helvetica Neue" panose="02000503000000020004" pitchFamily="2" charset="0"/>
               </a:defRPr>
             </a:lvl1pPr>
           </a:lstStyle>
           <a:p>
             <a:r>
-              <a:rPr lang="en-GB" altLang="ko-KR"/>
+              <a:rPr lang="en-GB" altLang="ko-KR" dirty="0"/>
               <a:t>Click to edit Master title style</a:t>
             </a:r>
             <a:endParaRPr lang="ko-KR" altLang="en-US" dirty="0"/>
@@ -1988,7 +1982,7 @@
         </p:nvSpPr>
         <p:spPr>
           <a:xfrm>
-            <a:off x="3347864" y="4030167"/>
+            <a:off x="3344285" y="5517232"/>
             <a:ext cx="2448272" cy="461665"/>
           </a:xfrm>
           <a:prstGeom prst="rect">
@@ -2011,24 +2005,34 @@
               </a:spcAft>
             </a:pPr>
             <a:r>
-              <a:rPr kumimoji="1" lang="en-US" altLang="ko-KR" sz="2400" b="1" dirty="0" err="1">
+              <a:rPr kumimoji="1" lang="en-US" altLang="zh-CN" sz="2400" b="1" dirty="0">
                 <a:solidFill>
                   <a:prstClr val="black"/>
                 </a:solidFill>
                 <a:latin typeface="맑은 고딕" pitchFamily="50" charset="-127"/>
                 <a:ea typeface="맑은 고딕" pitchFamily="50" charset="-127"/>
               </a:rPr>
-              <a:t>Youjip</a:t>
-            </a:r>
-            <a:r>
-              <a:rPr kumimoji="1" lang="en-US" altLang="ko-KR" sz="2400" b="1" baseline="0" dirty="0">
+              <a:t>Hong</a:t>
+            </a:r>
+            <a:r>
+              <a:rPr kumimoji="1" lang="zh-CN" altLang="en-US" sz="2400" b="1" dirty="0">
                 <a:solidFill>
                   <a:prstClr val="black"/>
                 </a:solidFill>
                 <a:latin typeface="맑은 고딕" pitchFamily="50" charset="-127"/>
                 <a:ea typeface="맑은 고딕" pitchFamily="50" charset="-127"/>
               </a:rPr>
-              <a:t> Won</a:t>
+              <a:t> </a:t>
+            </a:r>
+            <a:r>
+              <a:rPr kumimoji="1" lang="en-US" altLang="zh-CN" sz="2400" b="1" dirty="0">
+                <a:solidFill>
+                  <a:prstClr val="black"/>
+                </a:solidFill>
+                <a:latin typeface="맑은 고딕" pitchFamily="50" charset="-127"/>
+                <a:ea typeface="맑은 고딕" pitchFamily="50" charset="-127"/>
+              </a:rPr>
+              <a:t>Xu</a:t>
             </a:r>
             <a:endParaRPr kumimoji="1" lang="en-US" altLang="ko-KR" sz="2400" b="1" dirty="0">
               <a:solidFill>
@@ -2040,47 +2044,60 @@
           </a:p>
         </p:txBody>
       </p:sp>
-      <p:pic>
-        <p:nvPicPr>
-          <p:cNvPr id="2" name="그림 1"/>
-          <p:cNvPicPr>
-            <a:picLocks noChangeAspect="1"/>
-          </p:cNvPicPr>
-          <p:nvPr/>
-        </p:nvPicPr>
-        <p:blipFill>
-          <a:blip r:embed="rId2" cstate="print">
+      <p:sp>
+        <p:nvSpPr>
+          <p:cNvPr id="4" name="TextBox 3">
             <a:extLst>
-              <a:ext uri="{28A0092B-C50C-407E-A947-70E740481C1C}">
-                <a14:useLocalDpi xmlns:a14="http://schemas.microsoft.com/office/drawing/2010/main" val="0"/>
+              <a:ext uri="{FF2B5EF4-FFF2-40B4-BE49-F238E27FC236}">
+                <a16:creationId xmlns:a16="http://schemas.microsoft.com/office/drawing/2014/main" id="{D7A47015-6912-00BC-B289-2ACFBCCB2E9B}"/>
               </a:ext>
             </a:extLst>
-          </a:blip>
-          <a:stretch>
-            <a:fillRect/>
-          </a:stretch>
-        </p:blipFill>
+          </p:cNvPr>
+          <p:cNvSpPr txBox="1"/>
+          <p:nvPr/>
+        </p:nvSpPr>
         <p:spPr>
           <a:xfrm>
-            <a:off x="3252786" y="5013176"/>
-            <a:ext cx="2638429" cy="753613"/>
+            <a:off x="2351994" y="6048603"/>
+            <a:ext cx="4432853" cy="369332"/>
           </a:xfrm>
           <a:prstGeom prst="rect">
             <a:avLst/>
           </a:prstGeom>
-        </p:spPr>
-      </p:pic>
+          <a:noFill/>
+        </p:spPr>
+        <p:txBody>
+          <a:bodyPr wrap="square" rtlCol="0">
+            <a:spAutoFit/>
+          </a:bodyPr>
+          <a:lstStyle/>
+          <a:p>
+            <a:pPr algn="ctr"/>
+            <a:r>
+              <a:rPr lang="en-US" dirty="0">
+                <a:latin typeface="Malgun Gothic" panose="020B0503020000020004" pitchFamily="34" charset="-127"/>
+                <a:ea typeface="Malgun Gothic" panose="020B0503020000020004" pitchFamily="34" charset="-127"/>
+                <a:hlinkClick r:id="rId2"/>
+              </a:rPr>
+              <a:t>https://github.com/henryhxu/CSCI3150</a:t>
+            </a:r>
+            <a:endParaRPr lang="en-US" dirty="0">
+              <a:latin typeface="Malgun Gothic" panose="020B0503020000020004" pitchFamily="34" charset="-127"/>
+              <a:ea typeface="Malgun Gothic" panose="020B0503020000020004" pitchFamily="34" charset="-127"/>
+            </a:endParaRPr>
+          </a:p>
+        </p:txBody>
+      </p:sp>
     </p:spTree>
     <p:extLst>
       <p:ext uri="{BB962C8B-B14F-4D97-AF65-F5344CB8AC3E}">
-        <p14:creationId xmlns:p14="http://schemas.microsoft.com/office/powerpoint/2010/main" val="2716942226"/>
+        <p14:creationId xmlns:p14="http://schemas.microsoft.com/office/powerpoint/2010/main" val="3980156689"/>
       </p:ext>
     </p:extLst>
   </p:cSld>
   <p:clrMapOvr>
     <a:masterClrMapping/>
   </p:clrMapOvr>
-  <p:hf hdr="0" dt="0"/>
 </p:sldLayout>
 </file>
 
@@ -2157,14 +2174,12 @@
                 <a:solidFill>
                   <a:schemeClr val="bg1"/>
                 </a:solidFill>
+                <a:latin typeface="Malgun Gothic" panose="020B0503020000020004" pitchFamily="34" charset="-127"/>
+                <a:ea typeface="Malgun Gothic" panose="020B0503020000020004" pitchFamily="34" charset="-127"/>
               </a:defRPr>
             </a:lvl1pPr>
           </a:lstStyle>
           <a:p>
-            <a:r>
-              <a:rPr lang="en-GB" altLang="ko-KR"/>
-              <a:t>Click to edit Master title style</a:t>
-            </a:r>
             <a:endParaRPr lang="ko-KR" altLang="en-US" dirty="0"/>
           </a:p>
         </p:txBody>
@@ -2186,7 +2201,7 @@
           </a:xfrm>
         </p:spPr>
         <p:txBody>
-          <a:bodyPr/>
+          <a:bodyPr lIns="90000"/>
           <a:lstStyle>
             <a:lvl1pPr latinLnBrk="0">
               <a:lnSpc>
@@ -2201,7 +2216,7 @@
                 </a:solidFill>
               </a:defRPr>
             </a:lvl1pPr>
-            <a:lvl2pPr>
+            <a:lvl2pPr latinLnBrk="0">
               <a:lnSpc>
                 <a:spcPct val="150000"/>
               </a:lnSpc>
@@ -2319,12 +2334,32 @@
             </a:lvl1pPr>
           </a:lstStyle>
           <a:p>
-            <a:fld id="{5BCC3F0E-9362-6D47-9781-DB401EE9B6B9}" type="slidenum">
-              <a:rPr lang="en-US" smtClean="0"/>
-              <a:pPr/>
+            <a:pPr>
+              <a:defRPr/>
+            </a:pPr>
+            <a:fld id="{515CC4ED-1449-4712-AE45-EBC263B4DD26}" type="slidenum">
+              <a:rPr lang="en-US" altLang="ko-KR" smtClean="0">
+                <a:solidFill>
+                  <a:srgbClr val="1F497D">
+                    <a:lumMod val="50000"/>
+                  </a:srgbClr>
+                </a:solidFill>
+              </a:rPr>
+              <a:pPr>
+                <a:defRPr/>
+              </a:pPr>
               <a:t>‹#›</a:t>
             </a:fld>
-            <a:endParaRPr lang="en-US"/>
+            <a:r>
+              <a:rPr lang="en-US" altLang="ko-KR">
+                <a:solidFill>
+                  <a:srgbClr val="1F497D">
+                    <a:lumMod val="50000"/>
+                  </a:srgbClr>
+                </a:solidFill>
+              </a:rPr>
+              <a:t> </a:t>
+            </a:r>
           </a:p>
         </p:txBody>
       </p:sp>
@@ -2358,24 +2393,41 @@
             </a:lvl1pPr>
           </a:lstStyle>
           <a:p>
-            <a:r>
-              <a:rPr lang="en-US"/>
-              <a:t>CSCI3150 Intro to Operating Systems</a:t>
-            </a:r>
+            <a:pPr fontAlgn="base">
+              <a:spcBef>
+                <a:spcPct val="0"/>
+              </a:spcBef>
+              <a:spcAft>
+                <a:spcPct val="0"/>
+              </a:spcAft>
+              <a:defRPr/>
+            </a:pPr>
+            <a:r>
+              <a:rPr kumimoji="1" lang="en-US" altLang="ko-KR">
+                <a:solidFill>
+                  <a:prstClr val="black"/>
+                </a:solidFill>
+              </a:rPr>
+              <a:t>CSCI 3150 Intro to OS</a:t>
+            </a:r>
+            <a:endParaRPr kumimoji="1" lang="ko-KR" altLang="en-US" dirty="0">
+              <a:solidFill>
+                <a:prstClr val="black"/>
+              </a:solidFill>
+            </a:endParaRPr>
           </a:p>
         </p:txBody>
       </p:sp>
     </p:spTree>
     <p:extLst>
       <p:ext uri="{BB962C8B-B14F-4D97-AF65-F5344CB8AC3E}">
-        <p14:creationId xmlns:p14="http://schemas.microsoft.com/office/powerpoint/2010/main" val="3921098323"/>
+        <p14:creationId xmlns:p14="http://schemas.microsoft.com/office/powerpoint/2010/main" val="743493717"/>
       </p:ext>
     </p:extLst>
   </p:cSld>
   <p:clrMapOvr>
     <a:masterClrMapping/>
   </p:clrMapOvr>
-  <p:hf hdr="0" dt="0"/>
 </p:sldLayout>
 </file>
 
@@ -2568,12 +2620,32 @@
             </a:lvl1pPr>
           </a:lstStyle>
           <a:p>
-            <a:fld id="{5BCC3F0E-9362-6D47-9781-DB401EE9B6B9}" type="slidenum">
-              <a:rPr lang="en-US" smtClean="0"/>
-              <a:pPr/>
+            <a:pPr>
+              <a:defRPr/>
+            </a:pPr>
+            <a:fld id="{515CC4ED-1449-4712-AE45-EBC263B4DD26}" type="slidenum">
+              <a:rPr lang="en-US" altLang="ko-KR" smtClean="0">
+                <a:solidFill>
+                  <a:srgbClr val="1F497D">
+                    <a:lumMod val="50000"/>
+                  </a:srgbClr>
+                </a:solidFill>
+              </a:rPr>
+              <a:pPr>
+                <a:defRPr/>
+              </a:pPr>
               <a:t>‹#›</a:t>
             </a:fld>
-            <a:endParaRPr lang="en-US"/>
+            <a:r>
+              <a:rPr lang="en-US" altLang="ko-KR">
+                <a:solidFill>
+                  <a:srgbClr val="1F497D">
+                    <a:lumMod val="50000"/>
+                  </a:srgbClr>
+                </a:solidFill>
+              </a:rPr>
+              <a:t> </a:t>
+            </a:r>
           </a:p>
         </p:txBody>
       </p:sp>
@@ -2607,721 +2679,6 @@
             </a:lvl1pPr>
           </a:lstStyle>
           <a:p>
-            <a:r>
-              <a:rPr lang="en-US"/>
-              <a:t>CSCI3150 Intro to Operating Systems</a:t>
-            </a:r>
-          </a:p>
-        </p:txBody>
-      </p:sp>
-      <p:pic>
-        <p:nvPicPr>
-          <p:cNvPr id="10" name="그림 9"/>
-          <p:cNvPicPr>
-            <a:picLocks noChangeAspect="1"/>
-          </p:cNvPicPr>
-          <p:nvPr/>
-        </p:nvPicPr>
-        <p:blipFill>
-          <a:blip r:embed="rId2" cstate="print">
-            <a:extLst>
-              <a:ext uri="{28A0092B-C50C-407E-A947-70E740481C1C}">
-                <a14:useLocalDpi xmlns:a14="http://schemas.microsoft.com/office/drawing/2010/main" val="0"/>
-              </a:ext>
-            </a:extLst>
-          </a:blip>
-          <a:stretch>
-            <a:fillRect/>
-          </a:stretch>
-        </p:blipFill>
-        <p:spPr>
-          <a:xfrm>
-            <a:off x="216854" y="6593998"/>
-            <a:ext cx="768052" cy="219378"/>
-          </a:xfrm>
-          <a:prstGeom prst="rect">
-            <a:avLst/>
-          </a:prstGeom>
-        </p:spPr>
-      </p:pic>
-    </p:spTree>
-    <p:extLst>
-      <p:ext uri="{BB962C8B-B14F-4D97-AF65-F5344CB8AC3E}">
-        <p14:creationId xmlns:p14="http://schemas.microsoft.com/office/powerpoint/2010/main" val="592502715"/>
-      </p:ext>
-    </p:extLst>
-  </p:cSld>
-  <p:clrMapOvr>
-    <a:masterClrMapping/>
-  </p:clrMapOvr>
-  <p:hf hdr="0" dt="0"/>
-</p:sldLayout>
-</file>
-
-<file path=ppt/slideLayouts/slideLayout4.xml><?xml version="1.0" encoding="utf-8"?>
-<p:sldLayout xmlns:a="http://schemas.openxmlformats.org/drawingml/2006/main" xmlns:r="http://schemas.openxmlformats.org/officeDocument/2006/relationships" xmlns:p="http://schemas.openxmlformats.org/presentationml/2006/main" preserve="1">
-  <p:cSld name="제목 슬라이드">
-    <p:spTree>
-      <p:nvGrpSpPr>
-        <p:cNvPr id="1" name=""/>
-        <p:cNvGrpSpPr/>
-        <p:nvPr/>
-      </p:nvGrpSpPr>
-      <p:grpSpPr>
-        <a:xfrm>
-          <a:off x="0" y="0"/>
-          <a:ext cx="0" cy="0"/>
-          <a:chOff x="0" y="0"/>
-          <a:chExt cx="0" cy="0"/>
-        </a:xfrm>
-      </p:grpSpPr>
-      <p:sp>
-        <p:nvSpPr>
-          <p:cNvPr id="18" name="부제목 2"/>
-          <p:cNvSpPr>
-            <a:spLocks noGrp="1"/>
-          </p:cNvSpPr>
-          <p:nvPr>
-            <p:ph type="subTitle" idx="1"/>
-          </p:nvPr>
-        </p:nvSpPr>
-        <p:spPr>
-          <a:xfrm>
-            <a:off x="251520" y="78531"/>
-            <a:ext cx="8640960" cy="576065"/>
-          </a:xfrm>
-        </p:spPr>
-        <p:txBody>
-          <a:bodyPr anchor="ctr"/>
-          <a:lstStyle>
-            <a:lvl1pPr marL="0" indent="0" algn="ctr" rtl="0" fontAlgn="base" latinLnBrk="1">
-              <a:spcBef>
-                <a:spcPct val="0"/>
-              </a:spcBef>
-              <a:spcAft>
-                <a:spcPct val="0"/>
-              </a:spcAft>
-              <a:buNone/>
-              <a:defRPr kumimoji="1" lang="ko-KR" altLang="en-US" sz="2400" b="1" kern="1200" cap="none" spc="0" dirty="0">
-                <a:ln>
-                  <a:noFill/>
-                </a:ln>
-                <a:solidFill>
-                  <a:schemeClr val="bg1"/>
-                </a:solidFill>
-                <a:effectLst>
-                  <a:outerShdw blurRad="38100" dist="38100" dir="2700000" algn="tl">
-                    <a:srgbClr val="000000">
-                      <a:alpha val="43137"/>
-                    </a:srgbClr>
-                  </a:outerShdw>
-                </a:effectLst>
-                <a:latin typeface="+mj-lt"/>
-                <a:ea typeface="Arial" pitchFamily="34" charset="0"/>
-                <a:cs typeface="Arial" pitchFamily="34" charset="0"/>
-              </a:defRPr>
-            </a:lvl1pPr>
-            <a:lvl2pPr marL="457200" indent="0" algn="ctr">
-              <a:buNone/>
-              <a:defRPr/>
-            </a:lvl2pPr>
-            <a:lvl3pPr marL="914400" indent="0" algn="ctr">
-              <a:buNone/>
-              <a:defRPr/>
-            </a:lvl3pPr>
-            <a:lvl4pPr marL="1371600" indent="0" algn="ctr">
-              <a:buNone/>
-              <a:defRPr/>
-            </a:lvl4pPr>
-            <a:lvl5pPr marL="1828800" indent="0" algn="ctr">
-              <a:buNone/>
-              <a:defRPr/>
-            </a:lvl5pPr>
-            <a:lvl6pPr marL="2286000" indent="0" algn="ctr">
-              <a:buNone/>
-              <a:defRPr/>
-            </a:lvl6pPr>
-            <a:lvl7pPr marL="2743200" indent="0" algn="ctr">
-              <a:buNone/>
-              <a:defRPr/>
-            </a:lvl7pPr>
-            <a:lvl8pPr marL="3200400" indent="0" algn="ctr">
-              <a:buNone/>
-              <a:defRPr/>
-            </a:lvl8pPr>
-            <a:lvl9pPr marL="3657600" indent="0" algn="ctr">
-              <a:buNone/>
-              <a:defRPr/>
-            </a:lvl9pPr>
-          </a:lstStyle>
-          <a:p>
-            <a:r>
-              <a:rPr lang="en-GB" altLang="ko-KR"/>
-              <a:t>Click to edit Master subtitle style</a:t>
-            </a:r>
-            <a:endParaRPr lang="ko-KR" altLang="en-US" dirty="0"/>
-          </a:p>
-        </p:txBody>
-      </p:sp>
-      <p:sp>
-        <p:nvSpPr>
-          <p:cNvPr id="19" name="제목 1"/>
-          <p:cNvSpPr>
-            <a:spLocks noGrp="1"/>
-          </p:cNvSpPr>
-          <p:nvPr>
-            <p:ph type="ctrTitle"/>
-          </p:nvPr>
-        </p:nvSpPr>
-        <p:spPr>
-          <a:xfrm>
-            <a:off x="685800" y="1772816"/>
-            <a:ext cx="7772400" cy="1542033"/>
-          </a:xfrm>
-          <a:effectLst>
-            <a:outerShdw dist="17780" dir="2700000" algn="ctr" rotWithShape="0">
-              <a:srgbClr val="000000"/>
-            </a:outerShdw>
-          </a:effectLst>
-        </p:spPr>
-        <p:txBody>
-          <a:bodyPr/>
-          <a:lstStyle>
-            <a:lvl1pPr algn="ctr" rtl="0" fontAlgn="base" latinLnBrk="1">
-              <a:spcBef>
-                <a:spcPct val="0"/>
-              </a:spcBef>
-              <a:spcAft>
-                <a:spcPct val="0"/>
-              </a:spcAft>
-              <a:defRPr kumimoji="1" lang="ko-KR" altLang="en-US" sz="4400" b="1" kern="1200" dirty="0">
-                <a:solidFill>
-                  <a:schemeClr val="tx2">
-                    <a:lumMod val="75000"/>
-                  </a:schemeClr>
-                </a:solidFill>
-                <a:latin typeface="Adobe 고딕 Std B" pitchFamily="34" charset="-127"/>
-                <a:ea typeface="Adobe 고딕 Std B" pitchFamily="34" charset="-127"/>
-                <a:cs typeface="Adobe Arabic" pitchFamily="18" charset="-78"/>
-              </a:defRPr>
-            </a:lvl1pPr>
-          </a:lstStyle>
-          <a:p>
-            <a:r>
-              <a:rPr lang="en-GB" altLang="ko-KR"/>
-              <a:t>Click to edit Master title style</a:t>
-            </a:r>
-            <a:endParaRPr lang="ko-KR" altLang="en-US" dirty="0"/>
-          </a:p>
-        </p:txBody>
-      </p:sp>
-      <p:grpSp>
-        <p:nvGrpSpPr>
-          <p:cNvPr id="36" name="그룹 35"/>
-          <p:cNvGrpSpPr/>
-          <p:nvPr/>
-        </p:nvGrpSpPr>
-        <p:grpSpPr>
-          <a:xfrm>
-            <a:off x="-3579" y="3573016"/>
-            <a:ext cx="9147579" cy="64193"/>
-            <a:chOff x="-3579" y="3356992"/>
-            <a:chExt cx="9147579" cy="64193"/>
-          </a:xfrm>
-        </p:grpSpPr>
-        <p:cxnSp>
-          <p:nvCxnSpPr>
-            <p:cNvPr id="31" name="직선 연결선 30"/>
-            <p:cNvCxnSpPr/>
-            <p:nvPr/>
-          </p:nvCxnSpPr>
-          <p:spPr>
-            <a:xfrm>
-              <a:off x="0" y="3356992"/>
-              <a:ext cx="9144000" cy="0"/>
-            </a:xfrm>
-            <a:prstGeom prst="line">
-              <a:avLst/>
-            </a:prstGeom>
-            <a:ln w="63500">
-              <a:solidFill>
-                <a:schemeClr val="tx2">
-                  <a:lumMod val="75000"/>
-                </a:schemeClr>
-              </a:solidFill>
-              <a:tailEnd type="none"/>
-            </a:ln>
-          </p:spPr>
-          <p:style>
-            <a:lnRef idx="1">
-              <a:schemeClr val="accent1"/>
-            </a:lnRef>
-            <a:fillRef idx="0">
-              <a:schemeClr val="accent1"/>
-            </a:fillRef>
-            <a:effectRef idx="0">
-              <a:schemeClr val="accent1"/>
-            </a:effectRef>
-            <a:fontRef idx="minor">
-              <a:schemeClr val="tx1"/>
-            </a:fontRef>
-          </p:style>
-        </p:cxnSp>
-        <p:cxnSp>
-          <p:nvCxnSpPr>
-            <p:cNvPr id="32" name="직선 연결선 31"/>
-            <p:cNvCxnSpPr/>
-            <p:nvPr/>
-          </p:nvCxnSpPr>
-          <p:spPr>
-            <a:xfrm>
-              <a:off x="-3579" y="3421185"/>
-              <a:ext cx="9144000" cy="0"/>
-            </a:xfrm>
-            <a:prstGeom prst="line">
-              <a:avLst/>
-            </a:prstGeom>
-            <a:ln w="31750">
-              <a:solidFill>
-                <a:schemeClr val="accent1">
-                  <a:lumMod val="75000"/>
-                </a:schemeClr>
-              </a:solidFill>
-              <a:tailEnd type="none"/>
-            </a:ln>
-          </p:spPr>
-          <p:style>
-            <a:lnRef idx="1">
-              <a:schemeClr val="accent1"/>
-            </a:lnRef>
-            <a:fillRef idx="0">
-              <a:schemeClr val="accent1"/>
-            </a:fillRef>
-            <a:effectRef idx="0">
-              <a:schemeClr val="accent1"/>
-            </a:effectRef>
-            <a:fontRef idx="minor">
-              <a:schemeClr val="tx1"/>
-            </a:fontRef>
-          </p:style>
-        </p:cxnSp>
-      </p:grpSp>
-      <p:sp>
-        <p:nvSpPr>
-          <p:cNvPr id="12" name="TextBox 11"/>
-          <p:cNvSpPr txBox="1"/>
-          <p:nvPr/>
-        </p:nvSpPr>
-        <p:spPr>
-          <a:xfrm>
-            <a:off x="3344285" y="5517232"/>
-            <a:ext cx="2448272" cy="461665"/>
-          </a:xfrm>
-          <a:prstGeom prst="rect">
-            <a:avLst/>
-          </a:prstGeom>
-          <a:noFill/>
-        </p:spPr>
-        <p:txBody>
-          <a:bodyPr wrap="square" rtlCol="0">
-            <a:spAutoFit/>
-          </a:bodyPr>
-          <a:lstStyle/>
-          <a:p>
-            <a:pPr algn="ctr" fontAlgn="base">
-              <a:spcBef>
-                <a:spcPct val="0"/>
-              </a:spcBef>
-              <a:spcAft>
-                <a:spcPts val="600"/>
-              </a:spcAft>
-            </a:pPr>
-            <a:r>
-              <a:rPr kumimoji="1" lang="en-US" altLang="zh-CN" sz="2400" b="1" dirty="0">
-                <a:solidFill>
-                  <a:prstClr val="black"/>
-                </a:solidFill>
-                <a:latin typeface="맑은 고딕" pitchFamily="50" charset="-127"/>
-                <a:ea typeface="맑은 고딕" pitchFamily="50" charset="-127"/>
-              </a:rPr>
-              <a:t>Hong</a:t>
-            </a:r>
-            <a:r>
-              <a:rPr kumimoji="1" lang="zh-CN" altLang="en-US" sz="2400" b="1" dirty="0">
-                <a:solidFill>
-                  <a:prstClr val="black"/>
-                </a:solidFill>
-                <a:latin typeface="맑은 고딕" pitchFamily="50" charset="-127"/>
-                <a:ea typeface="맑은 고딕" pitchFamily="50" charset="-127"/>
-              </a:rPr>
-              <a:t> </a:t>
-            </a:r>
-            <a:r>
-              <a:rPr kumimoji="1" lang="en-US" altLang="zh-CN" sz="2400" b="1" dirty="0">
-                <a:solidFill>
-                  <a:prstClr val="black"/>
-                </a:solidFill>
-                <a:latin typeface="맑은 고딕" pitchFamily="50" charset="-127"/>
-                <a:ea typeface="맑은 고딕" pitchFamily="50" charset="-127"/>
-              </a:rPr>
-              <a:t>Xu</a:t>
-            </a:r>
-            <a:endParaRPr kumimoji="1" lang="en-US" altLang="ko-KR" sz="2400" b="1" dirty="0">
-              <a:solidFill>
-                <a:prstClr val="black"/>
-              </a:solidFill>
-              <a:latin typeface="맑은 고딕" pitchFamily="50" charset="-127"/>
-              <a:ea typeface="맑은 고딕" pitchFamily="50" charset="-127"/>
-            </a:endParaRPr>
-          </a:p>
-        </p:txBody>
-      </p:sp>
-      <p:sp>
-        <p:nvSpPr>
-          <p:cNvPr id="4" name="TextBox 3">
-            <a:extLst>
-              <a:ext uri="{FF2B5EF4-FFF2-40B4-BE49-F238E27FC236}">
-                <a16:creationId xmlns:a16="http://schemas.microsoft.com/office/drawing/2014/main" id="{D7A47015-6912-00BC-B289-2ACFBCCB2E9B}"/>
-              </a:ext>
-            </a:extLst>
-          </p:cNvPr>
-          <p:cNvSpPr txBox="1"/>
-          <p:nvPr/>
-        </p:nvSpPr>
-        <p:spPr>
-          <a:xfrm>
-            <a:off x="2351994" y="6048603"/>
-            <a:ext cx="4432853" cy="369332"/>
-          </a:xfrm>
-          <a:prstGeom prst="rect">
-            <a:avLst/>
-          </a:prstGeom>
-          <a:noFill/>
-        </p:spPr>
-        <p:txBody>
-          <a:bodyPr wrap="square" rtlCol="0">
-            <a:spAutoFit/>
-          </a:bodyPr>
-          <a:lstStyle/>
-          <a:p>
-            <a:pPr algn="ctr"/>
-            <a:r>
-              <a:rPr lang="en-US" dirty="0">
-                <a:hlinkClick r:id="rId2"/>
-              </a:rPr>
-              <a:t>https://github.com/henryhxu/CSCI3150</a:t>
-            </a:r>
-            <a:endParaRPr lang="en-US" dirty="0"/>
-          </a:p>
-        </p:txBody>
-      </p:sp>
-    </p:spTree>
-    <p:extLst>
-      <p:ext uri="{BB962C8B-B14F-4D97-AF65-F5344CB8AC3E}">
-        <p14:creationId xmlns:p14="http://schemas.microsoft.com/office/powerpoint/2010/main" val="430181682"/>
-      </p:ext>
-    </p:extLst>
-  </p:cSld>
-  <p:clrMapOvr>
-    <a:masterClrMapping/>
-  </p:clrMapOvr>
-</p:sldLayout>
-</file>
-
-<file path=ppt/slideLayouts/slideLayout5.xml><?xml version="1.0" encoding="utf-8"?>
-<p:sldLayout xmlns:a="http://schemas.openxmlformats.org/drawingml/2006/main" xmlns:r="http://schemas.openxmlformats.org/officeDocument/2006/relationships" xmlns:p="http://schemas.openxmlformats.org/presentationml/2006/main" type="obj" preserve="1">
-  <p:cSld name="제목 및 내용">
-    <p:spTree>
-      <p:nvGrpSpPr>
-        <p:cNvPr id="1" name=""/>
-        <p:cNvGrpSpPr/>
-        <p:nvPr/>
-      </p:nvGrpSpPr>
-      <p:grpSpPr>
-        <a:xfrm>
-          <a:off x="0" y="0"/>
-          <a:ext cx="0" cy="0"/>
-          <a:chOff x="0" y="0"/>
-          <a:chExt cx="0" cy="0"/>
-        </a:xfrm>
-      </p:grpSpPr>
-      <p:cxnSp>
-        <p:nvCxnSpPr>
-          <p:cNvPr id="4" name="직선 연결선 3"/>
-          <p:cNvCxnSpPr/>
-          <p:nvPr/>
-        </p:nvCxnSpPr>
-        <p:spPr>
-          <a:xfrm>
-            <a:off x="0" y="6500813"/>
-            <a:ext cx="9144000" cy="0"/>
-          </a:xfrm>
-          <a:prstGeom prst="line">
-            <a:avLst/>
-          </a:prstGeom>
-          <a:ln w="25400">
-            <a:solidFill>
-              <a:schemeClr val="tx2">
-                <a:lumMod val="75000"/>
-              </a:schemeClr>
-            </a:solidFill>
-          </a:ln>
-        </p:spPr>
-        <p:style>
-          <a:lnRef idx="1">
-            <a:schemeClr val="accent1"/>
-          </a:lnRef>
-          <a:fillRef idx="0">
-            <a:schemeClr val="accent1"/>
-          </a:fillRef>
-          <a:effectRef idx="0">
-            <a:schemeClr val="accent1"/>
-          </a:effectRef>
-          <a:fontRef idx="minor">
-            <a:schemeClr val="tx1"/>
-          </a:fontRef>
-        </p:style>
-      </p:cxnSp>
-      <p:sp>
-        <p:nvSpPr>
-          <p:cNvPr id="2" name="제목 1"/>
-          <p:cNvSpPr>
-            <a:spLocks noGrp="1"/>
-          </p:cNvSpPr>
-          <p:nvPr>
-            <p:ph type="title"/>
-          </p:nvPr>
-        </p:nvSpPr>
-        <p:spPr/>
-        <p:txBody>
-          <a:bodyPr/>
-          <a:lstStyle>
-            <a:lvl1pPr>
-              <a:defRPr sz="2400">
-                <a:solidFill>
-                  <a:schemeClr val="bg1"/>
-                </a:solidFill>
-              </a:defRPr>
-            </a:lvl1pPr>
-          </a:lstStyle>
-          <a:p>
-            <a:r>
-              <a:rPr lang="en-GB" altLang="ko-KR"/>
-              <a:t>Click to edit Master title style</a:t>
-            </a:r>
-            <a:endParaRPr lang="ko-KR" altLang="en-US" dirty="0"/>
-          </a:p>
-        </p:txBody>
-      </p:sp>
-      <p:sp>
-        <p:nvSpPr>
-          <p:cNvPr id="3" name="내용 개체 틀 2"/>
-          <p:cNvSpPr>
-            <a:spLocks noGrp="1"/>
-          </p:cNvSpPr>
-          <p:nvPr>
-            <p:ph idx="1"/>
-          </p:nvPr>
-        </p:nvSpPr>
-        <p:spPr>
-          <a:xfrm>
-            <a:off x="214313" y="880070"/>
-            <a:ext cx="8786812" cy="5501258"/>
-          </a:xfrm>
-        </p:spPr>
-        <p:txBody>
-          <a:bodyPr/>
-          <a:lstStyle>
-            <a:lvl1pPr>
-              <a:lnSpc>
-                <a:spcPct val="150000"/>
-              </a:lnSpc>
-              <a:buClr>
-                <a:srgbClr val="002060"/>
-              </a:buClr>
-              <a:defRPr sz="2000" b="0">
-                <a:solidFill>
-                  <a:schemeClr val="tx1"/>
-                </a:solidFill>
-              </a:defRPr>
-            </a:lvl1pPr>
-            <a:lvl2pPr latinLnBrk="0">
-              <a:lnSpc>
-                <a:spcPct val="150000"/>
-              </a:lnSpc>
-              <a:buClr>
-                <a:srgbClr val="002060"/>
-              </a:buClr>
-              <a:defRPr sz="1800">
-                <a:solidFill>
-                  <a:schemeClr val="tx1"/>
-                </a:solidFill>
-              </a:defRPr>
-            </a:lvl2pPr>
-            <a:lvl3pPr>
-              <a:lnSpc>
-                <a:spcPct val="150000"/>
-              </a:lnSpc>
-              <a:buClr>
-                <a:srgbClr val="002060"/>
-              </a:buClr>
-              <a:defRPr sz="1600">
-                <a:solidFill>
-                  <a:schemeClr val="tx1"/>
-                </a:solidFill>
-              </a:defRPr>
-            </a:lvl3pPr>
-            <a:lvl4pPr>
-              <a:lnSpc>
-                <a:spcPct val="150000"/>
-              </a:lnSpc>
-              <a:buClr>
-                <a:srgbClr val="002060"/>
-              </a:buClr>
-              <a:defRPr sz="1400">
-                <a:solidFill>
-                  <a:schemeClr val="tx1"/>
-                </a:solidFill>
-              </a:defRPr>
-            </a:lvl4pPr>
-            <a:lvl5pPr>
-              <a:lnSpc>
-                <a:spcPct val="150000"/>
-              </a:lnSpc>
-              <a:buClr>
-                <a:srgbClr val="002060"/>
-              </a:buClr>
-              <a:defRPr sz="1400">
-                <a:solidFill>
-                  <a:schemeClr val="tx1"/>
-                </a:solidFill>
-              </a:defRPr>
-            </a:lvl5pPr>
-          </a:lstStyle>
-          <a:p>
-            <a:pPr lvl="0"/>
-            <a:r>
-              <a:rPr lang="en-GB" altLang="ko-KR" dirty="0"/>
-              <a:t>Click to edit Master text styles</a:t>
-            </a:r>
-          </a:p>
-          <a:p>
-            <a:pPr lvl="1"/>
-            <a:r>
-              <a:rPr lang="en-GB" altLang="ko-KR" dirty="0"/>
-              <a:t>Second level</a:t>
-            </a:r>
-          </a:p>
-          <a:p>
-            <a:pPr lvl="2"/>
-            <a:r>
-              <a:rPr lang="en-GB" altLang="ko-KR" dirty="0"/>
-              <a:t>Third level</a:t>
-            </a:r>
-          </a:p>
-          <a:p>
-            <a:pPr lvl="3"/>
-            <a:r>
-              <a:rPr lang="en-GB" altLang="ko-KR" dirty="0"/>
-              <a:t>Fourth level</a:t>
-            </a:r>
-          </a:p>
-          <a:p>
-            <a:pPr lvl="4"/>
-            <a:r>
-              <a:rPr lang="en-GB" altLang="ko-KR" dirty="0"/>
-              <a:t>Fifth level</a:t>
-            </a:r>
-            <a:endParaRPr lang="ko-KR" altLang="en-US" dirty="0"/>
-          </a:p>
-        </p:txBody>
-      </p:sp>
-      <p:sp>
-        <p:nvSpPr>
-          <p:cNvPr id="7" name="Rectangle 6"/>
-          <p:cNvSpPr>
-            <a:spLocks noGrp="1" noChangeArrowheads="1"/>
-          </p:cNvSpPr>
-          <p:nvPr>
-            <p:ph type="sldNum" sz="quarter" idx="11"/>
-          </p:nvPr>
-        </p:nvSpPr>
-        <p:spPr>
-          <a:xfrm>
-            <a:off x="7964934" y="6592713"/>
-            <a:ext cx="1071562" cy="220663"/>
-          </a:xfrm>
-        </p:spPr>
-        <p:txBody>
-          <a:bodyPr/>
-          <a:lstStyle>
-            <a:lvl1pPr>
-              <a:defRPr b="1">
-                <a:latin typeface="맑은 고딕" pitchFamily="50" charset="-127"/>
-                <a:ea typeface="맑은 고딕" pitchFamily="50" charset="-127"/>
-              </a:defRPr>
-            </a:lvl1pPr>
-          </a:lstStyle>
-          <a:p>
-            <a:pPr>
-              <a:defRPr/>
-            </a:pPr>
-            <a:fld id="{515CC4ED-1449-4712-AE45-EBC263B4DD26}" type="slidenum">
-              <a:rPr lang="en-US" altLang="ko-KR" smtClean="0">
-                <a:solidFill>
-                  <a:srgbClr val="1F497D">
-                    <a:lumMod val="50000"/>
-                  </a:srgbClr>
-                </a:solidFill>
-              </a:rPr>
-              <a:pPr>
-                <a:defRPr/>
-              </a:pPr>
-              <a:t>‹#›</a:t>
-            </a:fld>
-            <a:r>
-              <a:rPr lang="en-US" altLang="ko-KR">
-                <a:solidFill>
-                  <a:srgbClr val="1F497D">
-                    <a:lumMod val="50000"/>
-                  </a:srgbClr>
-                </a:solidFill>
-              </a:rPr>
-              <a:t> </a:t>
-            </a:r>
-          </a:p>
-        </p:txBody>
-      </p:sp>
-      <p:sp>
-        <p:nvSpPr>
-          <p:cNvPr id="10" name="Rectangle 5"/>
-          <p:cNvSpPr>
-            <a:spLocks noGrp="1" noChangeArrowheads="1"/>
-          </p:cNvSpPr>
-          <p:nvPr>
-            <p:ph type="ftr" sz="quarter" idx="3"/>
-          </p:nvPr>
-        </p:nvSpPr>
-        <p:spPr>
-          <a:xfrm>
-            <a:off x="3033713" y="6582995"/>
-            <a:ext cx="3038475" cy="220663"/>
-          </a:xfrm>
-          <a:prstGeom prst="rect">
-            <a:avLst/>
-          </a:prstGeom>
-        </p:spPr>
-        <p:txBody>
-          <a:bodyPr/>
-          <a:lstStyle>
-            <a:lvl1pPr algn="ctr">
-              <a:defRPr sz="1000" b="1">
-                <a:latin typeface="맑은 고딕" pitchFamily="50" charset="-127"/>
-                <a:ea typeface="맑은 고딕" pitchFamily="50" charset="-127"/>
-              </a:defRPr>
-            </a:lvl1pPr>
-          </a:lstStyle>
-          <a:p>
             <a:pPr fontAlgn="base">
               <a:spcBef>
                 <a:spcPct val="0"/>
@@ -3350,293 +2707,7 @@
     </p:spTree>
     <p:extLst>
       <p:ext uri="{BB962C8B-B14F-4D97-AF65-F5344CB8AC3E}">
-        <p14:creationId xmlns:p14="http://schemas.microsoft.com/office/powerpoint/2010/main" val="2502524911"/>
-      </p:ext>
-    </p:extLst>
-  </p:cSld>
-  <p:clrMapOvr>
-    <a:masterClrMapping/>
-  </p:clrMapOvr>
-</p:sldLayout>
-</file>
-
-<file path=ppt/slideLayouts/slideLayout6.xml><?xml version="1.0" encoding="utf-8"?>
-<p:sldLayout xmlns:a="http://schemas.openxmlformats.org/drawingml/2006/main" xmlns:r="http://schemas.openxmlformats.org/officeDocument/2006/relationships" xmlns:p="http://schemas.openxmlformats.org/presentationml/2006/main" preserve="1">
-  <p:cSld name="구역 머리글">
-    <p:spTree>
-      <p:nvGrpSpPr>
-        <p:cNvPr id="1" name=""/>
-        <p:cNvGrpSpPr/>
-        <p:nvPr/>
-      </p:nvGrpSpPr>
-      <p:grpSpPr>
-        <a:xfrm>
-          <a:off x="0" y="0"/>
-          <a:ext cx="0" cy="0"/>
-          <a:chOff x="0" y="0"/>
-          <a:chExt cx="0" cy="0"/>
-        </a:xfrm>
-      </p:grpSpPr>
-      <p:cxnSp>
-        <p:nvCxnSpPr>
-          <p:cNvPr id="4" name="직선 연결선 3"/>
-          <p:cNvCxnSpPr/>
-          <p:nvPr/>
-        </p:nvCxnSpPr>
-        <p:spPr>
-          <a:xfrm>
-            <a:off x="214313" y="4429125"/>
-            <a:ext cx="8786812" cy="0"/>
-          </a:xfrm>
-          <a:prstGeom prst="line">
-            <a:avLst/>
-          </a:prstGeom>
-          <a:ln w="38100">
-            <a:solidFill>
-              <a:schemeClr val="tx2">
-                <a:lumMod val="50000"/>
-              </a:schemeClr>
-            </a:solidFill>
-          </a:ln>
-        </p:spPr>
-        <p:style>
-          <a:lnRef idx="1">
-            <a:schemeClr val="accent1"/>
-          </a:lnRef>
-          <a:fillRef idx="0">
-            <a:schemeClr val="accent1"/>
-          </a:fillRef>
-          <a:effectRef idx="0">
-            <a:schemeClr val="accent1"/>
-          </a:effectRef>
-          <a:fontRef idx="minor">
-            <a:schemeClr val="tx1"/>
-          </a:fontRef>
-        </p:style>
-      </p:cxnSp>
-      <p:sp>
-        <p:nvSpPr>
-          <p:cNvPr id="3" name="텍스트 개체 틀 2"/>
-          <p:cNvSpPr>
-            <a:spLocks noGrp="1"/>
-          </p:cNvSpPr>
-          <p:nvPr>
-            <p:ph type="body" idx="1"/>
-          </p:nvPr>
-        </p:nvSpPr>
-        <p:spPr>
-          <a:xfrm>
-            <a:off x="891994" y="2906713"/>
-            <a:ext cx="8072494" cy="1500187"/>
-          </a:xfrm>
-        </p:spPr>
-        <p:txBody>
-          <a:bodyPr anchor="b"/>
-          <a:lstStyle>
-            <a:lvl1pPr marL="0" indent="0" algn="r">
-              <a:buNone/>
-              <a:defRPr sz="3200" b="1">
-                <a:solidFill>
-                  <a:schemeClr val="tx2">
-                    <a:lumMod val="50000"/>
-                  </a:schemeClr>
-                </a:solidFill>
-              </a:defRPr>
-            </a:lvl1pPr>
-            <a:lvl2pPr marL="457200" indent="0">
-              <a:buNone/>
-              <a:defRPr sz="1800"/>
-            </a:lvl2pPr>
-            <a:lvl3pPr marL="914400" indent="0">
-              <a:buNone/>
-              <a:defRPr sz="1600"/>
-            </a:lvl3pPr>
-            <a:lvl4pPr marL="1371600" indent="0">
-              <a:buNone/>
-              <a:defRPr sz="1400"/>
-            </a:lvl4pPr>
-            <a:lvl5pPr marL="1828800" indent="0">
-              <a:buNone/>
-              <a:defRPr sz="1400"/>
-            </a:lvl5pPr>
-            <a:lvl6pPr marL="2286000" indent="0">
-              <a:buNone/>
-              <a:defRPr sz="1400"/>
-            </a:lvl6pPr>
-            <a:lvl7pPr marL="2743200" indent="0">
-              <a:buNone/>
-              <a:defRPr sz="1400"/>
-            </a:lvl7pPr>
-            <a:lvl8pPr marL="3200400" indent="0">
-              <a:buNone/>
-              <a:defRPr sz="1400"/>
-            </a:lvl8pPr>
-            <a:lvl9pPr marL="3657600" indent="0">
-              <a:buNone/>
-              <a:defRPr sz="1400"/>
-            </a:lvl9pPr>
-          </a:lstStyle>
-          <a:p>
-            <a:pPr lvl="0"/>
-            <a:r>
-              <a:rPr lang="en-GB" altLang="ko-KR"/>
-              <a:t>Click to edit Master text styles</a:t>
-            </a:r>
-          </a:p>
-        </p:txBody>
-      </p:sp>
-      <p:cxnSp>
-        <p:nvCxnSpPr>
-          <p:cNvPr id="9" name="직선 연결선 8"/>
-          <p:cNvCxnSpPr/>
-          <p:nvPr/>
-        </p:nvCxnSpPr>
-        <p:spPr>
-          <a:xfrm>
-            <a:off x="0" y="6500813"/>
-            <a:ext cx="9144000" cy="0"/>
-          </a:xfrm>
-          <a:prstGeom prst="line">
-            <a:avLst/>
-          </a:prstGeom>
-          <a:ln w="25400">
-            <a:solidFill>
-              <a:schemeClr val="tx2">
-                <a:lumMod val="75000"/>
-              </a:schemeClr>
-            </a:solidFill>
-          </a:ln>
-        </p:spPr>
-        <p:style>
-          <a:lnRef idx="1">
-            <a:schemeClr val="accent1"/>
-          </a:lnRef>
-          <a:fillRef idx="0">
-            <a:schemeClr val="accent1"/>
-          </a:fillRef>
-          <a:effectRef idx="0">
-            <a:schemeClr val="accent1"/>
-          </a:effectRef>
-          <a:fontRef idx="minor">
-            <a:schemeClr val="tx1"/>
-          </a:fontRef>
-        </p:style>
-      </p:cxnSp>
-      <p:sp>
-        <p:nvSpPr>
-          <p:cNvPr id="14" name="Rectangle 6"/>
-          <p:cNvSpPr>
-            <a:spLocks noGrp="1" noChangeArrowheads="1"/>
-          </p:cNvSpPr>
-          <p:nvPr>
-            <p:ph type="sldNum" sz="quarter" idx="11"/>
-          </p:nvPr>
-        </p:nvSpPr>
-        <p:spPr>
-          <a:xfrm>
-            <a:off x="7964934" y="6592713"/>
-            <a:ext cx="1071562" cy="220663"/>
-          </a:xfrm>
-        </p:spPr>
-        <p:txBody>
-          <a:bodyPr/>
-          <a:lstStyle>
-            <a:lvl1pPr>
-              <a:defRPr b="1">
-                <a:latin typeface="맑은 고딕" pitchFamily="50" charset="-127"/>
-                <a:ea typeface="맑은 고딕" pitchFamily="50" charset="-127"/>
-              </a:defRPr>
-            </a:lvl1pPr>
-          </a:lstStyle>
-          <a:p>
-            <a:pPr>
-              <a:defRPr/>
-            </a:pPr>
-            <a:fld id="{515CC4ED-1449-4712-AE45-EBC263B4DD26}" type="slidenum">
-              <a:rPr lang="en-US" altLang="ko-KR" smtClean="0">
-                <a:solidFill>
-                  <a:srgbClr val="1F497D">
-                    <a:lumMod val="50000"/>
-                  </a:srgbClr>
-                </a:solidFill>
-              </a:rPr>
-              <a:pPr>
-                <a:defRPr/>
-              </a:pPr>
-              <a:t>‹#›</a:t>
-            </a:fld>
-            <a:r>
-              <a:rPr lang="en-US" altLang="ko-KR">
-                <a:solidFill>
-                  <a:srgbClr val="1F497D">
-                    <a:lumMod val="50000"/>
-                  </a:srgbClr>
-                </a:solidFill>
-              </a:rPr>
-              <a:t> </a:t>
-            </a:r>
-          </a:p>
-        </p:txBody>
-      </p:sp>
-      <p:sp>
-        <p:nvSpPr>
-          <p:cNvPr id="15" name="Rectangle 5"/>
-          <p:cNvSpPr>
-            <a:spLocks noGrp="1" noChangeArrowheads="1"/>
-          </p:cNvSpPr>
-          <p:nvPr>
-            <p:ph type="ftr" sz="quarter" idx="3"/>
-          </p:nvPr>
-        </p:nvSpPr>
-        <p:spPr>
-          <a:xfrm>
-            <a:off x="3033713" y="6582995"/>
-            <a:ext cx="3038475" cy="220663"/>
-          </a:xfrm>
-          <a:prstGeom prst="rect">
-            <a:avLst/>
-          </a:prstGeom>
-        </p:spPr>
-        <p:txBody>
-          <a:bodyPr/>
-          <a:lstStyle>
-            <a:lvl1pPr algn="ctr">
-              <a:defRPr sz="1000" b="1">
-                <a:latin typeface="맑은 고딕" pitchFamily="50" charset="-127"/>
-                <a:ea typeface="맑은 고딕" pitchFamily="50" charset="-127"/>
-              </a:defRPr>
-            </a:lvl1pPr>
-          </a:lstStyle>
-          <a:p>
-            <a:pPr fontAlgn="base">
-              <a:spcBef>
-                <a:spcPct val="0"/>
-              </a:spcBef>
-              <a:spcAft>
-                <a:spcPct val="0"/>
-              </a:spcAft>
-              <a:defRPr/>
-            </a:pPr>
-            <a:r>
-              <a:rPr kumimoji="1" lang="en-US" altLang="ko-KR">
-                <a:solidFill>
-                  <a:prstClr val="black"/>
-                </a:solidFill>
-              </a:rPr>
-              <a:t>CSCI 3150 Intro to OS</a:t>
-            </a:r>
-            <a:endParaRPr kumimoji="1" lang="ko-KR" altLang="en-US" dirty="0">
-              <a:solidFill>
-                <a:prstClr val="black"/>
-              </a:solidFill>
-            </a:endParaRPr>
-          </a:p>
-        </p:txBody>
-      </p:sp>
-    </p:spTree>
-    <p:extLst>
-      <p:ext uri="{BB962C8B-B14F-4D97-AF65-F5344CB8AC3E}">
-        <p14:creationId xmlns:p14="http://schemas.microsoft.com/office/powerpoint/2010/main" val="858713346"/>
+        <p14:creationId xmlns:p14="http://schemas.microsoft.com/office/powerpoint/2010/main" val="591536692"/>
       </p:ext>
     </p:extLst>
   </p:cSld>
@@ -3843,61 +2914,6 @@
       </p:sp>
       <p:sp>
         <p:nvSpPr>
-          <p:cNvPr id="3" name="Rectangle 4"/>
-          <p:cNvSpPr>
-            <a:spLocks noGrp="1" noChangeArrowheads="1"/>
-          </p:cNvSpPr>
-          <p:nvPr>
-            <p:ph type="dt" sz="half" idx="2"/>
-          </p:nvPr>
-        </p:nvSpPr>
-        <p:spPr bwMode="auto">
-          <a:xfrm>
-            <a:off x="214313" y="6562725"/>
-            <a:ext cx="1285875" cy="220663"/>
-          </a:xfrm>
-          <a:prstGeom prst="rect">
-            <a:avLst/>
-          </a:prstGeom>
-          <a:noFill/>
-          <a:ln w="9525">
-            <a:noFill/>
-            <a:miter lim="800000"/>
-            <a:headEnd/>
-            <a:tailEnd/>
-          </a:ln>
-          <a:effectLst/>
-        </p:spPr>
-        <p:txBody>
-          <a:bodyPr vert="horz" wrap="square" lIns="91440" tIns="45720" rIns="91440" bIns="45720" numCol="1" anchor="ctr" anchorCtr="0" compatLnSpc="1">
-            <a:prstTxWarp prst="textNoShape">
-              <a:avLst/>
-            </a:prstTxWarp>
-          </a:bodyPr>
-          <a:lstStyle>
-            <a:lvl1pPr>
-              <a:defRPr sz="1000">
-                <a:solidFill>
-                  <a:schemeClr val="tx2">
-                    <a:lumMod val="50000"/>
-                  </a:schemeClr>
-                </a:solidFill>
-                <a:latin typeface="굴림" pitchFamily="50" charset="-127"/>
-                <a:ea typeface="굴림" pitchFamily="50" charset="-127"/>
-              </a:defRPr>
-            </a:lvl1pPr>
-          </a:lstStyle>
-          <a:p>
-            <a:r>
-              <a:rPr lang="en-HK"/>
-              <a:t>1/20/13</a:t>
-            </a:r>
-            <a:endParaRPr lang="en-US"/>
-          </a:p>
-        </p:txBody>
-      </p:sp>
-      <p:sp>
-        <p:nvSpPr>
           <p:cNvPr id="1030" name="Rectangle 6"/>
           <p:cNvSpPr>
             <a:spLocks noGrp="1" noChangeArrowheads="1"/>
@@ -3943,12 +2959,41 @@
             </a:lvl1pPr>
           </a:lstStyle>
           <a:p>
-            <a:fld id="{5BCC3F0E-9362-6D47-9781-DB401EE9B6B9}" type="slidenum">
-              <a:rPr lang="en-US" smtClean="0"/>
-              <a:pPr/>
+            <a:pPr fontAlgn="base">
+              <a:spcBef>
+                <a:spcPct val="0"/>
+              </a:spcBef>
+              <a:spcAft>
+                <a:spcPct val="0"/>
+              </a:spcAft>
+              <a:defRPr/>
+            </a:pPr>
+            <a:fld id="{85A0C360-F875-469D-A977-82806D0D3C5E}" type="slidenum">
+              <a:rPr kumimoji="1" lang="en-US" altLang="ko-KR">
+                <a:solidFill>
+                  <a:srgbClr val="1F497D">
+                    <a:lumMod val="50000"/>
+                  </a:srgbClr>
+                </a:solidFill>
+              </a:rPr>
+              <a:pPr fontAlgn="base">
+                <a:spcBef>
+                  <a:spcPct val="0"/>
+                </a:spcBef>
+                <a:spcAft>
+                  <a:spcPct val="0"/>
+                </a:spcAft>
+                <a:defRPr/>
+              </a:pPr>
               <a:t>‹#›</a:t>
             </a:fld>
-            <a:endParaRPr lang="en-US"/>
+            <a:endParaRPr kumimoji="1" lang="en-US" altLang="ko-KR">
+              <a:solidFill>
+                <a:srgbClr val="1F497D">
+                  <a:lumMod val="50000"/>
+                </a:srgbClr>
+              </a:solidFill>
+            </a:endParaRPr>
           </a:p>
         </p:txBody>
       </p:sp>
@@ -3982,10 +3027,28 @@
             </a:lvl1pPr>
           </a:lstStyle>
           <a:p>
-            <a:r>
-              <a:rPr lang="en-US"/>
-              <a:t>CSCI3150 Intro to Operating Systems</a:t>
-            </a:r>
+            <a:pPr fontAlgn="base">
+              <a:spcBef>
+                <a:spcPct val="0"/>
+              </a:spcBef>
+              <a:spcAft>
+                <a:spcPct val="0"/>
+              </a:spcAft>
+              <a:defRPr/>
+            </a:pPr>
+            <a:r>
+              <a:rPr kumimoji="1" lang="en-US" altLang="ko-KR">
+                <a:solidFill>
+                  <a:prstClr val="black"/>
+                </a:solidFill>
+              </a:rPr>
+              <a:t>CSCI 3150 Intro to OS</a:t>
+            </a:r>
+            <a:endParaRPr kumimoji="1" lang="ko-KR" altLang="en-US" dirty="0">
+              <a:solidFill>
+                <a:prstClr val="black"/>
+              </a:solidFill>
+            </a:endParaRPr>
           </a:p>
         </p:txBody>
       </p:sp>
@@ -4045,15 +3108,15 @@
     </p:spTree>
     <p:extLst>
       <p:ext uri="{BB962C8B-B14F-4D97-AF65-F5344CB8AC3E}">
-        <p14:creationId xmlns:p14="http://schemas.microsoft.com/office/powerpoint/2010/main" val="2429887983"/>
+        <p14:creationId xmlns:p14="http://schemas.microsoft.com/office/powerpoint/2010/main" val="1087249443"/>
       </p:ext>
     </p:extLst>
   </p:cSld>
   <p:clrMap bg1="lt1" tx1="dk1" bg2="lt2" tx2="dk2" accent1="accent1" accent2="accent2" accent3="accent3" accent4="accent4" accent5="accent5" accent6="accent6" hlink="hlink" folHlink="folHlink"/>
   <p:sldLayoutIdLst>
-    <p:sldLayoutId id="2147483773" r:id="rId1"/>
-    <p:sldLayoutId id="2147483774" r:id="rId2"/>
-    <p:sldLayoutId id="2147483775" r:id="rId3"/>
+    <p:sldLayoutId id="2147483782" r:id="rId1"/>
+    <p:sldLayoutId id="2147483783" r:id="rId2"/>
+    <p:sldLayoutId id="2147483784" r:id="rId3"/>
   </p:sldLayoutIdLst>
   <p:hf hdr="0" dt="0"/>
   <p:txStyles>
@@ -4196,818 +3259,7 @@
       </a:lvl9pPr>
     </p:titleStyle>
     <p:bodyStyle>
-      <a:lvl1pPr marL="342900" indent="-342900" algn="l" rtl="0" eaLnBrk="1" fontAlgn="base" latinLnBrk="1" hangingPunct="1">
-        <a:spcBef>
-          <a:spcPct val="20000"/>
-        </a:spcBef>
-        <a:spcAft>
-          <a:spcPct val="0"/>
-        </a:spcAft>
-        <a:buClr>
-          <a:srgbClr val="002060"/>
-        </a:buClr>
-        <a:buSzPct val="65000"/>
-        <a:buFont typeface="Wingdings" pitchFamily="2" charset="2"/>
-        <a:buChar char=""/>
-        <a:defRPr kumimoji="1" sz="2000">
-          <a:solidFill>
-            <a:srgbClr val="10253F"/>
-          </a:solidFill>
-          <a:latin typeface="맑은 고딕" pitchFamily="50" charset="-127"/>
-          <a:ea typeface="맑은 고딕" pitchFamily="50" charset="-127"/>
-          <a:cs typeface="+mn-cs"/>
-        </a:defRPr>
-      </a:lvl1pPr>
-      <a:lvl2pPr marL="742950" indent="-285750" algn="l" rtl="0" eaLnBrk="1" fontAlgn="base" latinLnBrk="1" hangingPunct="1">
-        <a:spcBef>
-          <a:spcPct val="20000"/>
-        </a:spcBef>
-        <a:spcAft>
-          <a:spcPct val="0"/>
-        </a:spcAft>
-        <a:buClr>
-          <a:srgbClr val="007E3C"/>
-        </a:buClr>
-        <a:buSzPct val="100000"/>
-        <a:buFont typeface="Wingdings" pitchFamily="2" charset="2"/>
-        <a:buChar char=""/>
-        <a:defRPr kumimoji="1">
-          <a:solidFill>
-            <a:srgbClr val="10253F"/>
-          </a:solidFill>
-          <a:latin typeface="맑은 고딕" pitchFamily="50" charset="-127"/>
-          <a:ea typeface="맑은 고딕" pitchFamily="50" charset="-127"/>
-        </a:defRPr>
-      </a:lvl2pPr>
-      <a:lvl3pPr marL="1143000" indent="-228600" algn="l" rtl="0" eaLnBrk="1" fontAlgn="base" latinLnBrk="1" hangingPunct="1">
-        <a:spcBef>
-          <a:spcPct val="20000"/>
-        </a:spcBef>
-        <a:spcAft>
-          <a:spcPct val="0"/>
-        </a:spcAft>
-        <a:buClr>
-          <a:srgbClr val="002060"/>
-        </a:buClr>
-        <a:buSzPct val="65000"/>
-        <a:buFont typeface="Wingdings" pitchFamily="2" charset="2"/>
-        <a:buChar char=""/>
-        <a:defRPr kumimoji="1" sz="1600">
-          <a:solidFill>
-            <a:srgbClr val="10253F"/>
-          </a:solidFill>
-          <a:latin typeface="맑은 고딕" pitchFamily="50" charset="-127"/>
-          <a:ea typeface="맑은 고딕" pitchFamily="50" charset="-127"/>
-        </a:defRPr>
-      </a:lvl3pPr>
-      <a:lvl4pPr marL="1600200" indent="-228600" algn="l" rtl="0" eaLnBrk="1" fontAlgn="base" latinLnBrk="1" hangingPunct="1">
-        <a:spcBef>
-          <a:spcPct val="20000"/>
-        </a:spcBef>
-        <a:spcAft>
-          <a:spcPct val="0"/>
-        </a:spcAft>
-        <a:buClr>
-          <a:srgbClr val="00B03C"/>
-        </a:buClr>
-        <a:buSzPct val="65000"/>
-        <a:buFont typeface="Wingdings" pitchFamily="2" charset="2"/>
-        <a:buChar char=""/>
-        <a:defRPr kumimoji="1" sz="1400">
-          <a:solidFill>
-            <a:srgbClr val="10253F"/>
-          </a:solidFill>
-          <a:latin typeface="맑은 고딕" pitchFamily="50" charset="-127"/>
-          <a:ea typeface="맑은 고딕" pitchFamily="50" charset="-127"/>
-        </a:defRPr>
-      </a:lvl4pPr>
-      <a:lvl5pPr marL="2057400" indent="-228600" algn="l" rtl="0" eaLnBrk="1" fontAlgn="base" latinLnBrk="1" hangingPunct="1">
-        <a:spcBef>
-          <a:spcPct val="20000"/>
-        </a:spcBef>
-        <a:spcAft>
-          <a:spcPct val="0"/>
-        </a:spcAft>
-        <a:buClr>
-          <a:srgbClr val="002060"/>
-        </a:buClr>
-        <a:buFont typeface="Wingdings" pitchFamily="2" charset="2"/>
-        <a:buChar char=""/>
-        <a:defRPr kumimoji="1" sz="1400">
-          <a:solidFill>
-            <a:srgbClr val="10253F"/>
-          </a:solidFill>
-          <a:latin typeface="맑은 고딕" pitchFamily="50" charset="-127"/>
-          <a:ea typeface="맑은 고딕" pitchFamily="50" charset="-127"/>
-        </a:defRPr>
-      </a:lvl5pPr>
-      <a:lvl6pPr marL="2514600" indent="-228600" algn="l" rtl="0" eaLnBrk="1" fontAlgn="base" latinLnBrk="1" hangingPunct="1">
-        <a:spcBef>
-          <a:spcPct val="20000"/>
-        </a:spcBef>
-        <a:spcAft>
-          <a:spcPct val="0"/>
-        </a:spcAft>
-        <a:buChar char="»"/>
-        <a:defRPr kumimoji="1" sz="2000">
-          <a:solidFill>
-            <a:schemeClr val="tx1"/>
-          </a:solidFill>
-          <a:latin typeface="+mn-lt"/>
-          <a:ea typeface="+mn-ea"/>
-        </a:defRPr>
-      </a:lvl6pPr>
-      <a:lvl7pPr marL="2971800" indent="-228600" algn="l" rtl="0" eaLnBrk="1" fontAlgn="base" latinLnBrk="1" hangingPunct="1">
-        <a:spcBef>
-          <a:spcPct val="20000"/>
-        </a:spcBef>
-        <a:spcAft>
-          <a:spcPct val="0"/>
-        </a:spcAft>
-        <a:buChar char="»"/>
-        <a:defRPr kumimoji="1" sz="2000">
-          <a:solidFill>
-            <a:schemeClr val="tx1"/>
-          </a:solidFill>
-          <a:latin typeface="+mn-lt"/>
-          <a:ea typeface="+mn-ea"/>
-        </a:defRPr>
-      </a:lvl7pPr>
-      <a:lvl8pPr marL="3429000" indent="-228600" algn="l" rtl="0" eaLnBrk="1" fontAlgn="base" latinLnBrk="1" hangingPunct="1">
-        <a:spcBef>
-          <a:spcPct val="20000"/>
-        </a:spcBef>
-        <a:spcAft>
-          <a:spcPct val="0"/>
-        </a:spcAft>
-        <a:buChar char="»"/>
-        <a:defRPr kumimoji="1" sz="2000">
-          <a:solidFill>
-            <a:schemeClr val="tx1"/>
-          </a:solidFill>
-          <a:latin typeface="+mn-lt"/>
-          <a:ea typeface="+mn-ea"/>
-        </a:defRPr>
-      </a:lvl8pPr>
-      <a:lvl9pPr marL="3886200" indent="-228600" algn="l" rtl="0" eaLnBrk="1" fontAlgn="base" latinLnBrk="1" hangingPunct="1">
-        <a:spcBef>
-          <a:spcPct val="20000"/>
-        </a:spcBef>
-        <a:spcAft>
-          <a:spcPct val="0"/>
-        </a:spcAft>
-        <a:buChar char="»"/>
-        <a:defRPr kumimoji="1" sz="2000">
-          <a:solidFill>
-            <a:schemeClr val="tx1"/>
-          </a:solidFill>
-          <a:latin typeface="+mn-lt"/>
-          <a:ea typeface="+mn-ea"/>
-        </a:defRPr>
-      </a:lvl9pPr>
-    </p:bodyStyle>
-    <p:otherStyle>
-      <a:defPPr>
-        <a:defRPr lang="ko-KR"/>
-      </a:defPPr>
-      <a:lvl1pPr marL="0" algn="l" defTabSz="914400" rtl="0" eaLnBrk="1" latinLnBrk="1" hangingPunct="1">
-        <a:defRPr sz="1800" kern="1200">
-          <a:solidFill>
-            <a:schemeClr val="tx1"/>
-          </a:solidFill>
-          <a:latin typeface="+mn-lt"/>
-          <a:ea typeface="+mn-ea"/>
-          <a:cs typeface="+mn-cs"/>
-        </a:defRPr>
-      </a:lvl1pPr>
-      <a:lvl2pPr marL="457200" algn="l" defTabSz="914400" rtl="0" eaLnBrk="1" latinLnBrk="1" hangingPunct="1">
-        <a:defRPr sz="1800" kern="1200">
-          <a:solidFill>
-            <a:schemeClr val="tx1"/>
-          </a:solidFill>
-          <a:latin typeface="+mn-lt"/>
-          <a:ea typeface="+mn-ea"/>
-          <a:cs typeface="+mn-cs"/>
-        </a:defRPr>
-      </a:lvl2pPr>
-      <a:lvl3pPr marL="914400" algn="l" defTabSz="914400" rtl="0" eaLnBrk="1" latinLnBrk="1" hangingPunct="1">
-        <a:defRPr sz="1800" kern="1200">
-          <a:solidFill>
-            <a:schemeClr val="tx1"/>
-          </a:solidFill>
-          <a:latin typeface="+mn-lt"/>
-          <a:ea typeface="+mn-ea"/>
-          <a:cs typeface="+mn-cs"/>
-        </a:defRPr>
-      </a:lvl3pPr>
-      <a:lvl4pPr marL="1371600" algn="l" defTabSz="914400" rtl="0" eaLnBrk="1" latinLnBrk="1" hangingPunct="1">
-        <a:defRPr sz="1800" kern="1200">
-          <a:solidFill>
-            <a:schemeClr val="tx1"/>
-          </a:solidFill>
-          <a:latin typeface="+mn-lt"/>
-          <a:ea typeface="+mn-ea"/>
-          <a:cs typeface="+mn-cs"/>
-        </a:defRPr>
-      </a:lvl4pPr>
-      <a:lvl5pPr marL="1828800" algn="l" defTabSz="914400" rtl="0" eaLnBrk="1" latinLnBrk="1" hangingPunct="1">
-        <a:defRPr sz="1800" kern="1200">
-          <a:solidFill>
-            <a:schemeClr val="tx1"/>
-          </a:solidFill>
-          <a:latin typeface="+mn-lt"/>
-          <a:ea typeface="+mn-ea"/>
-          <a:cs typeface="+mn-cs"/>
-        </a:defRPr>
-      </a:lvl5pPr>
-      <a:lvl6pPr marL="2286000" algn="l" defTabSz="914400" rtl="0" eaLnBrk="1" latinLnBrk="1" hangingPunct="1">
-        <a:defRPr sz="1800" kern="1200">
-          <a:solidFill>
-            <a:schemeClr val="tx1"/>
-          </a:solidFill>
-          <a:latin typeface="+mn-lt"/>
-          <a:ea typeface="+mn-ea"/>
-          <a:cs typeface="+mn-cs"/>
-        </a:defRPr>
-      </a:lvl6pPr>
-      <a:lvl7pPr marL="2743200" algn="l" defTabSz="914400" rtl="0" eaLnBrk="1" latinLnBrk="1" hangingPunct="1">
-        <a:defRPr sz="1800" kern="1200">
-          <a:solidFill>
-            <a:schemeClr val="tx1"/>
-          </a:solidFill>
-          <a:latin typeface="+mn-lt"/>
-          <a:ea typeface="+mn-ea"/>
-          <a:cs typeface="+mn-cs"/>
-        </a:defRPr>
-      </a:lvl7pPr>
-      <a:lvl8pPr marL="3200400" algn="l" defTabSz="914400" rtl="0" eaLnBrk="1" latinLnBrk="1" hangingPunct="1">
-        <a:defRPr sz="1800" kern="1200">
-          <a:solidFill>
-            <a:schemeClr val="tx1"/>
-          </a:solidFill>
-          <a:latin typeface="+mn-lt"/>
-          <a:ea typeface="+mn-ea"/>
-          <a:cs typeface="+mn-cs"/>
-        </a:defRPr>
-      </a:lvl8pPr>
-      <a:lvl9pPr marL="3657600" algn="l" defTabSz="914400" rtl="0" eaLnBrk="1" latinLnBrk="1" hangingPunct="1">
-        <a:defRPr sz="1800" kern="1200">
-          <a:solidFill>
-            <a:schemeClr val="tx1"/>
-          </a:solidFill>
-          <a:latin typeface="+mn-lt"/>
-          <a:ea typeface="+mn-ea"/>
-          <a:cs typeface="+mn-cs"/>
-        </a:defRPr>
-      </a:lvl9pPr>
-    </p:otherStyle>
-  </p:txStyles>
-</p:sldMaster>
-</file>
-
-<file path=ppt/slideMasters/slideMaster2.xml><?xml version="1.0" encoding="utf-8"?>
-<p:sldMaster xmlns:a="http://schemas.openxmlformats.org/drawingml/2006/main" xmlns:r="http://schemas.openxmlformats.org/officeDocument/2006/relationships" xmlns:p="http://schemas.openxmlformats.org/presentationml/2006/main" preserve="1">
-  <p:cSld>
-    <p:bg>
-      <p:bgPr>
-        <a:solidFill>
-          <a:schemeClr val="bg1"/>
-        </a:solidFill>
-        <a:effectLst/>
-      </p:bgPr>
-    </p:bg>
-    <p:spTree>
-      <p:nvGrpSpPr>
-        <p:cNvPr id="1" name=""/>
-        <p:cNvGrpSpPr/>
-        <p:nvPr/>
-      </p:nvGrpSpPr>
-      <p:grpSpPr>
-        <a:xfrm>
-          <a:off x="0" y="0"/>
-          <a:ext cx="0" cy="0"/>
-          <a:chOff x="0" y="0"/>
-          <a:chExt cx="0" cy="0"/>
-        </a:xfrm>
-      </p:grpSpPr>
-      <p:sp>
-        <p:nvSpPr>
-          <p:cNvPr id="5" name="직사각형 4"/>
-          <p:cNvSpPr/>
-          <p:nvPr/>
-        </p:nvSpPr>
-        <p:spPr>
-          <a:xfrm>
-            <a:off x="0" y="-611"/>
-            <a:ext cx="9144000" cy="706619"/>
-          </a:xfrm>
-          <a:prstGeom prst="rect">
-            <a:avLst/>
-          </a:prstGeom>
-          <a:solidFill>
-            <a:schemeClr val="tx2">
-              <a:lumMod val="75000"/>
-            </a:schemeClr>
-          </a:solidFill>
-          <a:ln w="9525">
-            <a:noFill/>
-          </a:ln>
-        </p:spPr>
-        <p:style>
-          <a:lnRef idx="3">
-            <a:schemeClr val="lt1"/>
-          </a:lnRef>
-          <a:fillRef idx="1">
-            <a:schemeClr val="accent1"/>
-          </a:fillRef>
-          <a:effectRef idx="1">
-            <a:schemeClr val="accent1"/>
-          </a:effectRef>
-          <a:fontRef idx="minor">
-            <a:schemeClr val="lt1"/>
-          </a:fontRef>
-        </p:style>
-        <p:txBody>
-          <a:bodyPr lIns="252000" rtlCol="0" anchor="ctr"/>
-          <a:lstStyle/>
-          <a:p>
-            <a:pPr algn="ctr"/>
-            <a:endParaRPr lang="ko-KR" altLang="en-US" sz="1600" dirty="0">
-              <a:solidFill>
-                <a:srgbClr val="00B050"/>
-              </a:solidFill>
-              <a:latin typeface="Courier New" pitchFamily="49" charset="0"/>
-              <a:ea typeface="맑은 고딕" pitchFamily="50" charset="-127"/>
-              <a:cs typeface="Courier New" pitchFamily="49" charset="0"/>
-            </a:endParaRPr>
-          </a:p>
-        </p:txBody>
-      </p:sp>
-      <p:sp>
-        <p:nvSpPr>
-          <p:cNvPr id="2" name="Rectangle 2"/>
-          <p:cNvSpPr>
-            <a:spLocks noGrp="1" noChangeArrowheads="1"/>
-          </p:cNvSpPr>
-          <p:nvPr>
-            <p:ph type="title"/>
-          </p:nvPr>
-        </p:nvSpPr>
-        <p:spPr bwMode="auto">
-          <a:xfrm>
-            <a:off x="214313" y="55563"/>
-            <a:ext cx="8786812" cy="585787"/>
-          </a:xfrm>
-          <a:prstGeom prst="rect">
-            <a:avLst/>
-          </a:prstGeom>
-          <a:noFill/>
-          <a:ln w="9525">
-            <a:noFill/>
-            <a:miter lim="800000"/>
-            <a:headEnd/>
-            <a:tailEnd/>
-          </a:ln>
-          <a:effectLst>
-            <a:outerShdw dist="17961" dir="2700000" algn="ctr" rotWithShape="0">
-              <a:schemeClr val="tx1"/>
-            </a:outerShdw>
-          </a:effectLst>
-        </p:spPr>
-        <p:txBody>
-          <a:bodyPr vert="horz" wrap="square" lIns="91440" tIns="45720" rIns="91440" bIns="45720" numCol="1" anchor="ctr" anchorCtr="0" compatLnSpc="1">
-            <a:prstTxWarp prst="textNoShape">
-              <a:avLst/>
-            </a:prstTxWarp>
-          </a:bodyPr>
-          <a:lstStyle/>
-          <a:p>
-            <a:pPr lvl="0"/>
-            <a:r>
-              <a:rPr lang="ko-KR" altLang="en-US" dirty="0"/>
-              <a:t>마스터 제목 스타일 편집</a:t>
-            </a:r>
-          </a:p>
-        </p:txBody>
-      </p:sp>
-      <p:sp>
-        <p:nvSpPr>
-          <p:cNvPr id="1028" name="Rectangle 3"/>
-          <p:cNvSpPr>
-            <a:spLocks noGrp="1" noChangeArrowheads="1"/>
-          </p:cNvSpPr>
-          <p:nvPr>
-            <p:ph type="body" idx="1"/>
-          </p:nvPr>
-        </p:nvSpPr>
-        <p:spPr bwMode="auto">
-          <a:xfrm>
-            <a:off x="214313" y="1000125"/>
-            <a:ext cx="8786812" cy="5429250"/>
-          </a:xfrm>
-          <a:prstGeom prst="rect">
-            <a:avLst/>
-          </a:prstGeom>
-          <a:noFill/>
-          <a:ln w="9525">
-            <a:noFill/>
-            <a:miter lim="800000"/>
-            <a:headEnd/>
-            <a:tailEnd/>
-          </a:ln>
-        </p:spPr>
-        <p:txBody>
-          <a:bodyPr vert="horz" wrap="square" lIns="91440" tIns="45720" rIns="91440" bIns="45720" numCol="1" anchor="t" anchorCtr="0" compatLnSpc="1">
-            <a:prstTxWarp prst="textNoShape">
-              <a:avLst/>
-            </a:prstTxWarp>
-          </a:bodyPr>
-          <a:lstStyle/>
-          <a:p>
-            <a:pPr lvl="0"/>
-            <a:r>
-              <a:rPr lang="ko-KR" altLang="en-US" dirty="0"/>
-              <a:t>마스터 텍스트 스타일을 편집합니다</a:t>
-            </a:r>
-          </a:p>
-          <a:p>
-            <a:pPr lvl="1"/>
-            <a:r>
-              <a:rPr lang="ko-KR" altLang="en-US" dirty="0"/>
-              <a:t>둘째 수준</a:t>
-            </a:r>
-          </a:p>
-          <a:p>
-            <a:pPr lvl="2"/>
-            <a:r>
-              <a:rPr lang="ko-KR" altLang="en-US" dirty="0"/>
-              <a:t>셋째 수준</a:t>
-            </a:r>
-          </a:p>
-          <a:p>
-            <a:pPr lvl="3"/>
-            <a:r>
-              <a:rPr lang="ko-KR" altLang="en-US" dirty="0"/>
-              <a:t>넷째 수준</a:t>
-            </a:r>
-          </a:p>
-          <a:p>
-            <a:pPr lvl="4"/>
-            <a:r>
-              <a:rPr lang="ko-KR" altLang="en-US" dirty="0"/>
-              <a:t>다섯째 수준</a:t>
-            </a:r>
-          </a:p>
-        </p:txBody>
-      </p:sp>
-      <p:sp>
-        <p:nvSpPr>
-          <p:cNvPr id="1030" name="Rectangle 6"/>
-          <p:cNvSpPr>
-            <a:spLocks noGrp="1" noChangeArrowheads="1"/>
-          </p:cNvSpPr>
-          <p:nvPr>
-            <p:ph type="sldNum" sz="quarter" idx="4"/>
-          </p:nvPr>
-        </p:nvSpPr>
-        <p:spPr bwMode="auto">
-          <a:xfrm>
-            <a:off x="7500938" y="6562725"/>
-            <a:ext cx="1071562" cy="220663"/>
-          </a:xfrm>
-          <a:prstGeom prst="rect">
-            <a:avLst/>
-          </a:prstGeom>
-          <a:noFill/>
-          <a:ln w="9525">
-            <a:noFill/>
-            <a:miter lim="800000"/>
-            <a:headEnd/>
-            <a:tailEnd/>
-          </a:ln>
-          <a:effectLst/>
-        </p:spPr>
-        <p:txBody>
-          <a:bodyPr vert="horz" wrap="square" lIns="91440" tIns="45720" rIns="91440" bIns="45720" numCol="1" anchor="ctr" anchorCtr="0" compatLnSpc="1">
-            <a:prstTxWarp prst="textNoShape">
-              <a:avLst/>
-            </a:prstTxWarp>
-          </a:bodyPr>
-          <a:lstStyle>
-            <a:lvl1pPr algn="r">
-              <a:defRPr sz="1000">
-                <a:solidFill>
-                  <a:schemeClr val="tx2">
-                    <a:lumMod val="50000"/>
-                  </a:schemeClr>
-                </a:solidFill>
-                <a:latin typeface="굴림" pitchFamily="50" charset="-127"/>
-                <a:ea typeface="굴림" pitchFamily="50" charset="-127"/>
-              </a:defRPr>
-            </a:lvl1pPr>
-          </a:lstStyle>
-          <a:p>
-            <a:pPr fontAlgn="base">
-              <a:spcBef>
-                <a:spcPct val="0"/>
-              </a:spcBef>
-              <a:spcAft>
-                <a:spcPct val="0"/>
-              </a:spcAft>
-              <a:defRPr/>
-            </a:pPr>
-            <a:fld id="{85A0C360-F875-469D-A977-82806D0D3C5E}" type="slidenum">
-              <a:rPr kumimoji="1" lang="en-US" altLang="ko-KR">
-                <a:solidFill>
-                  <a:srgbClr val="1F497D">
-                    <a:lumMod val="50000"/>
-                  </a:srgbClr>
-                </a:solidFill>
-              </a:rPr>
-              <a:pPr fontAlgn="base">
-                <a:spcBef>
-                  <a:spcPct val="0"/>
-                </a:spcBef>
-                <a:spcAft>
-                  <a:spcPct val="0"/>
-                </a:spcAft>
-                <a:defRPr/>
-              </a:pPr>
-              <a:t>‹#›</a:t>
-            </a:fld>
-            <a:endParaRPr kumimoji="1" lang="en-US" altLang="ko-KR">
-              <a:solidFill>
-                <a:srgbClr val="1F497D">
-                  <a:lumMod val="50000"/>
-                </a:srgbClr>
-              </a:solidFill>
-            </a:endParaRPr>
-          </a:p>
-        </p:txBody>
-      </p:sp>
-      <p:sp>
-        <p:nvSpPr>
-          <p:cNvPr id="8" name="Rectangle 5"/>
-          <p:cNvSpPr>
-            <a:spLocks noGrp="1" noChangeArrowheads="1"/>
-          </p:cNvSpPr>
-          <p:nvPr>
-            <p:ph type="ftr" sz="quarter" idx="3"/>
-          </p:nvPr>
-        </p:nvSpPr>
-        <p:spPr>
-          <a:xfrm>
-            <a:off x="3033713" y="6559550"/>
-            <a:ext cx="3038475" cy="220663"/>
-          </a:xfrm>
-          <a:prstGeom prst="rect">
-            <a:avLst/>
-          </a:prstGeom>
-        </p:spPr>
-        <p:txBody>
-          <a:bodyPr/>
-          <a:lstStyle>
-            <a:lvl1pPr algn="ctr">
-              <a:defRPr sz="1100" b="1">
-                <a:latin typeface="맑은 고딕" pitchFamily="50" charset="-127"/>
-                <a:ea typeface="맑은 고딕" pitchFamily="50" charset="-127"/>
-              </a:defRPr>
-            </a:lvl1pPr>
-          </a:lstStyle>
-          <a:p>
-            <a:pPr fontAlgn="base">
-              <a:spcBef>
-                <a:spcPct val="0"/>
-              </a:spcBef>
-              <a:spcAft>
-                <a:spcPct val="0"/>
-              </a:spcAft>
-              <a:defRPr/>
-            </a:pPr>
-            <a:r>
-              <a:rPr kumimoji="1" lang="en-US" altLang="ko-KR">
-                <a:solidFill>
-                  <a:prstClr val="black"/>
-                </a:solidFill>
-              </a:rPr>
-              <a:t>CSCI 3150 Intro to OS</a:t>
-            </a:r>
-            <a:endParaRPr kumimoji="1" lang="ko-KR" altLang="en-US" dirty="0">
-              <a:solidFill>
-                <a:prstClr val="black"/>
-              </a:solidFill>
-            </a:endParaRPr>
-          </a:p>
-        </p:txBody>
-      </p:sp>
-      <p:sp>
-        <p:nvSpPr>
-          <p:cNvPr id="10" name="직사각형 9"/>
-          <p:cNvSpPr/>
-          <p:nvPr/>
-        </p:nvSpPr>
-        <p:spPr>
-          <a:xfrm>
-            <a:off x="0" y="706008"/>
-            <a:ext cx="9144000" cy="45719"/>
-          </a:xfrm>
-          <a:prstGeom prst="rect">
-            <a:avLst/>
-          </a:prstGeom>
-          <a:solidFill>
-            <a:schemeClr val="accent1">
-              <a:lumMod val="75000"/>
-            </a:schemeClr>
-          </a:solidFill>
-          <a:ln w="9525">
-            <a:noFill/>
-          </a:ln>
-        </p:spPr>
-        <p:style>
-          <a:lnRef idx="3">
-            <a:schemeClr val="lt1"/>
-          </a:lnRef>
-          <a:fillRef idx="1">
-            <a:schemeClr val="accent1"/>
-          </a:fillRef>
-          <a:effectRef idx="1">
-            <a:schemeClr val="accent1"/>
-          </a:effectRef>
-          <a:fontRef idx="minor">
-            <a:schemeClr val="lt1"/>
-          </a:fontRef>
-        </p:style>
-        <p:txBody>
-          <a:bodyPr lIns="252000" rtlCol="0" anchor="ctr"/>
-          <a:lstStyle/>
-          <a:p>
-            <a:pPr algn="ctr"/>
-            <a:endParaRPr lang="ko-KR" altLang="en-US" sz="1600" dirty="0">
-              <a:solidFill>
-                <a:srgbClr val="00B050"/>
-              </a:solidFill>
-              <a:latin typeface="Courier New" pitchFamily="49" charset="0"/>
-              <a:ea typeface="맑은 고딕" pitchFamily="50" charset="-127"/>
-              <a:cs typeface="Courier New" pitchFamily="49" charset="0"/>
-            </a:endParaRPr>
-          </a:p>
-        </p:txBody>
-      </p:sp>
-    </p:spTree>
-    <p:extLst>
-      <p:ext uri="{BB962C8B-B14F-4D97-AF65-F5344CB8AC3E}">
-        <p14:creationId xmlns:p14="http://schemas.microsoft.com/office/powerpoint/2010/main" val="1820135578"/>
-      </p:ext>
-    </p:extLst>
-  </p:cSld>
-  <p:clrMap bg1="lt1" tx1="dk1" bg2="lt2" tx2="dk2" accent1="accent1" accent2="accent2" accent3="accent3" accent4="accent4" accent5="accent5" accent6="accent6" hlink="hlink" folHlink="folHlink"/>
-  <p:sldLayoutIdLst>
-    <p:sldLayoutId id="2147483778" r:id="rId1"/>
-    <p:sldLayoutId id="2147483779" r:id="rId2"/>
-    <p:sldLayoutId id="2147483780" r:id="rId3"/>
-  </p:sldLayoutIdLst>
-  <p:hf hdr="0" dt="0"/>
-  <p:txStyles>
-    <p:titleStyle>
-      <a:lvl1pPr algn="l" rtl="0" eaLnBrk="1" fontAlgn="base" latinLnBrk="1" hangingPunct="1">
-        <a:spcBef>
-          <a:spcPct val="0"/>
-        </a:spcBef>
-        <a:spcAft>
-          <a:spcPct val="0"/>
-        </a:spcAft>
-        <a:defRPr kumimoji="1" sz="2400">
-          <a:solidFill>
-            <a:schemeClr val="bg1"/>
-          </a:solidFill>
-          <a:latin typeface="+mj-lt"/>
-          <a:ea typeface="+mj-ea"/>
-          <a:cs typeface="+mj-cs"/>
-        </a:defRPr>
-      </a:lvl1pPr>
-      <a:lvl2pPr algn="l" rtl="0" eaLnBrk="1" fontAlgn="base" latinLnBrk="1" hangingPunct="1">
-        <a:spcBef>
-          <a:spcPct val="0"/>
-        </a:spcBef>
-        <a:spcAft>
-          <a:spcPct val="0"/>
-        </a:spcAft>
-        <a:defRPr kumimoji="1" sz="2400">
-          <a:solidFill>
-            <a:srgbClr val="FFFF00"/>
-          </a:solidFill>
-          <a:latin typeface="HY견고딕" pitchFamily="18" charset="-127"/>
-          <a:ea typeface="HY견고딕" pitchFamily="18" charset="-127"/>
-        </a:defRPr>
-      </a:lvl2pPr>
-      <a:lvl3pPr algn="l" rtl="0" eaLnBrk="1" fontAlgn="base" latinLnBrk="1" hangingPunct="1">
-        <a:spcBef>
-          <a:spcPct val="0"/>
-        </a:spcBef>
-        <a:spcAft>
-          <a:spcPct val="0"/>
-        </a:spcAft>
-        <a:defRPr kumimoji="1" sz="2400">
-          <a:solidFill>
-            <a:srgbClr val="FFFF00"/>
-          </a:solidFill>
-          <a:latin typeface="HY견고딕" pitchFamily="18" charset="-127"/>
-          <a:ea typeface="HY견고딕" pitchFamily="18" charset="-127"/>
-        </a:defRPr>
-      </a:lvl3pPr>
-      <a:lvl4pPr algn="l" rtl="0" eaLnBrk="1" fontAlgn="base" latinLnBrk="1" hangingPunct="1">
-        <a:spcBef>
-          <a:spcPct val="0"/>
-        </a:spcBef>
-        <a:spcAft>
-          <a:spcPct val="0"/>
-        </a:spcAft>
-        <a:defRPr kumimoji="1" sz="2400">
-          <a:solidFill>
-            <a:srgbClr val="FFFF00"/>
-          </a:solidFill>
-          <a:latin typeface="HY견고딕" pitchFamily="18" charset="-127"/>
-          <a:ea typeface="HY견고딕" pitchFamily="18" charset="-127"/>
-        </a:defRPr>
-      </a:lvl4pPr>
-      <a:lvl5pPr algn="l" rtl="0" eaLnBrk="1" fontAlgn="base" latinLnBrk="1" hangingPunct="1">
-        <a:spcBef>
-          <a:spcPct val="0"/>
-        </a:spcBef>
-        <a:spcAft>
-          <a:spcPct val="0"/>
-        </a:spcAft>
-        <a:defRPr kumimoji="1" sz="2400">
-          <a:solidFill>
-            <a:srgbClr val="FFFF00"/>
-          </a:solidFill>
-          <a:latin typeface="HY견고딕" pitchFamily="18" charset="-127"/>
-          <a:ea typeface="HY견고딕" pitchFamily="18" charset="-127"/>
-        </a:defRPr>
-      </a:lvl5pPr>
-      <a:lvl6pPr marL="457200" algn="l" rtl="0" eaLnBrk="1" fontAlgn="base" latinLnBrk="1" hangingPunct="1">
-        <a:spcBef>
-          <a:spcPct val="0"/>
-        </a:spcBef>
-        <a:spcAft>
-          <a:spcPct val="0"/>
-        </a:spcAft>
-        <a:defRPr kumimoji="1" sz="3000">
-          <a:solidFill>
-            <a:schemeClr val="bg1"/>
-          </a:solidFill>
-          <a:latin typeface="HY견고딕" pitchFamily="18" charset="-127"/>
-          <a:ea typeface="HY견고딕" pitchFamily="18" charset="-127"/>
-        </a:defRPr>
-      </a:lvl6pPr>
-      <a:lvl7pPr marL="914400" algn="l" rtl="0" eaLnBrk="1" fontAlgn="base" latinLnBrk="1" hangingPunct="1">
-        <a:spcBef>
-          <a:spcPct val="0"/>
-        </a:spcBef>
-        <a:spcAft>
-          <a:spcPct val="0"/>
-        </a:spcAft>
-        <a:defRPr kumimoji="1" sz="3000">
-          <a:solidFill>
-            <a:schemeClr val="bg1"/>
-          </a:solidFill>
-          <a:latin typeface="HY견고딕" pitchFamily="18" charset="-127"/>
-          <a:ea typeface="HY견고딕" pitchFamily="18" charset="-127"/>
-        </a:defRPr>
-      </a:lvl7pPr>
-      <a:lvl8pPr marL="1371600" algn="l" rtl="0" eaLnBrk="1" fontAlgn="base" latinLnBrk="1" hangingPunct="1">
-        <a:spcBef>
-          <a:spcPct val="0"/>
-        </a:spcBef>
-        <a:spcAft>
-          <a:spcPct val="0"/>
-        </a:spcAft>
-        <a:defRPr kumimoji="1" sz="3000">
-          <a:solidFill>
-            <a:schemeClr val="bg1"/>
-          </a:solidFill>
-          <a:latin typeface="HY견고딕" pitchFamily="18" charset="-127"/>
-          <a:ea typeface="HY견고딕" pitchFamily="18" charset="-127"/>
-        </a:defRPr>
-      </a:lvl8pPr>
-      <a:lvl9pPr marL="1828800" algn="l" rtl="0" eaLnBrk="1" fontAlgn="base" latinLnBrk="1" hangingPunct="1">
-        <a:spcBef>
-          <a:spcPct val="0"/>
-        </a:spcBef>
-        <a:spcAft>
-          <a:spcPct val="0"/>
-        </a:spcAft>
-        <a:defRPr kumimoji="1" sz="3000">
-          <a:solidFill>
-            <a:schemeClr val="bg1"/>
-          </a:solidFill>
-          <a:latin typeface="HY견고딕" pitchFamily="18" charset="-127"/>
-          <a:ea typeface="HY견고딕" pitchFamily="18" charset="-127"/>
-        </a:defRPr>
-      </a:lvl9pPr>
-    </p:titleStyle>
-    <p:bodyStyle>
-      <a:lvl1pPr marL="342900" indent="-342900" algn="l" rtl="0" eaLnBrk="1" fontAlgn="base" latinLnBrk="1" hangingPunct="1">
+      <a:lvl1pPr marL="342900" indent="-342900" algn="l" rtl="0" eaLnBrk="1" fontAlgn="base" latinLnBrk="0" hangingPunct="1">
         <a:spcBef>
           <a:spcPct val="20000"/>
         </a:spcBef>
@@ -5334,34 +3586,89 @@
           <a:p>
             <a:pPr latinLnBrk="0"/>
             <a:r>
-              <a:rPr lang="en-US" altLang="zh-CN" sz="3600" dirty="0"/>
+              <a:rPr lang="en-US" altLang="zh-CN" sz="4000" b="1" dirty="0">
+                <a:solidFill>
+                  <a:schemeClr val="accent1">
+                    <a:lumMod val="75000"/>
+                  </a:schemeClr>
+                </a:solidFill>
+                <a:ea typeface="Helvetica Neue" panose="02000503000000020004" pitchFamily="2" charset="0"/>
+              </a:rPr>
               <a:t>CSCI3150</a:t>
             </a:r>
             <a:r>
-              <a:rPr lang="zh-CN" altLang="en-US" sz="3600" dirty="0"/>
+              <a:rPr lang="zh-CN" altLang="en-US" sz="4000" b="1" dirty="0">
+                <a:solidFill>
+                  <a:schemeClr val="accent1">
+                    <a:lumMod val="75000"/>
+                  </a:schemeClr>
+                </a:solidFill>
+              </a:rPr>
               <a:t> </a:t>
             </a:r>
             <a:r>
-              <a:rPr lang="en-US" altLang="zh-CN" sz="3600" dirty="0"/>
+              <a:rPr lang="en-US" altLang="zh-CN" sz="4000" b="1" dirty="0">
+                <a:solidFill>
+                  <a:schemeClr val="accent1">
+                    <a:lumMod val="75000"/>
+                  </a:schemeClr>
+                </a:solidFill>
+                <a:ea typeface="Helvetica Neue" panose="02000503000000020004" pitchFamily="2" charset="0"/>
+              </a:rPr>
               <a:t>Introduction</a:t>
             </a:r>
             <a:r>
-              <a:rPr lang="zh-CN" altLang="en-US" sz="3600" dirty="0"/>
+              <a:rPr lang="zh-CN" altLang="en-US" sz="4000" b="1" dirty="0">
+                <a:solidFill>
+                  <a:schemeClr val="accent1">
+                    <a:lumMod val="75000"/>
+                  </a:schemeClr>
+                </a:solidFill>
+              </a:rPr>
               <a:t> </a:t>
             </a:r>
             <a:r>
-              <a:rPr lang="en-US" altLang="zh-CN" sz="3600" dirty="0"/>
+              <a:rPr lang="en-US" altLang="zh-CN" sz="4000" b="1" dirty="0">
+                <a:solidFill>
+                  <a:schemeClr val="accent1">
+                    <a:lumMod val="75000"/>
+                  </a:schemeClr>
+                </a:solidFill>
+                <a:ea typeface="Helvetica Neue" panose="02000503000000020004" pitchFamily="2" charset="0"/>
+              </a:rPr>
               <a:t>to</a:t>
             </a:r>
             <a:r>
-              <a:rPr lang="zh-CN" altLang="en-US" sz="3600" dirty="0"/>
+              <a:rPr lang="zh-CN" altLang="en-US" sz="4000" b="1" dirty="0">
+                <a:solidFill>
+                  <a:schemeClr val="accent1">
+                    <a:lumMod val="75000"/>
+                  </a:schemeClr>
+                </a:solidFill>
+              </a:rPr>
               <a:t> </a:t>
             </a:r>
-            <a:r>
-              <a:rPr lang="en-US" sz="3600" dirty="0"/>
+            <a:br>
+              <a:rPr lang="en-HK" altLang="zh-CN" sz="4000" b="1" dirty="0">
+                <a:solidFill>
+                  <a:schemeClr val="accent1">
+                    <a:lumMod val="75000"/>
+                  </a:schemeClr>
+                </a:solidFill>
+                <a:ea typeface="Helvetica Neue" panose="02000503000000020004" pitchFamily="2" charset="0"/>
+              </a:rPr>
+            </a:br>
+            <a:r>
+              <a:rPr lang="en-US" sz="4000" b="1" dirty="0">
+                <a:solidFill>
+                  <a:schemeClr val="accent1">
+                    <a:lumMod val="75000"/>
+                  </a:schemeClr>
+                </a:solidFill>
+                <a:ea typeface="Helvetica Neue" panose="02000503000000020004" pitchFamily="2" charset="0"/>
+              </a:rPr>
               <a:t>Operating Systems</a:t>
             </a:r>
-            <a:endParaRPr lang="en-US" sz="1600" b="0" dirty="0"/>
           </a:p>
         </p:txBody>
       </p:sp>
@@ -5509,7 +3816,7 @@
     </p:spTree>
     <p:extLst>
       <p:ext uri="{BB962C8B-B14F-4D97-AF65-F5344CB8AC3E}">
-        <p14:creationId xmlns:p14="http://schemas.microsoft.com/office/powerpoint/2010/main" val="3144308033"/>
+        <p14:creationId xmlns:p14="http://schemas.microsoft.com/office/powerpoint/2010/main" val="2678183122"/>
       </p:ext>
     </p:extLst>
   </p:cSld>
@@ -10687,7 +8994,7 @@
               <a:defRPr/>
             </a:pPr>
             <a:r>
-              <a:rPr lang="en-US"/>
+              <a:rPr lang="en-US" dirty="0"/>
               <a:t>Processes</a:t>
             </a:r>
           </a:p>
@@ -27755,7 +26062,7 @@
 </file>
 
 <file path=ppt/theme/theme1.xml><?xml version="1.0" encoding="utf-8"?>
-<a:theme xmlns:a="http://schemas.openxmlformats.org/drawingml/2006/main" name="3150">
+<a:theme xmlns:a="http://schemas.openxmlformats.org/drawingml/2006/main" name="2_양식_공청회_발표자료-총괄-양식">
   <a:themeElements>
     <a:clrScheme name="Office">
       <a:dk1>
@@ -28537,14 +26844,14 @@
   </a:extraClrSchemeLst>
   <a:extLst>
     <a:ext uri="{05A4C25C-085E-4340-85A3-A5531E510DB2}">
-      <thm15:themeFamily xmlns:thm15="http://schemas.microsoft.com/office/thememl/2012/main" name="3150" id="{5CA7F7AF-ED8C-AA4E-96F3-C3C7BE1512A6}" vid="{F85903AB-D508-BB47-851C-D8C41168E676}"/>
+      <thm15:themeFamily xmlns:thm15="http://schemas.microsoft.com/office/thememl/2012/main" name="csci3150" id="{E94D436E-0DFA-ED4E-AAA2-2332FAA45A4C}" vid="{31E95165-3AAC-6A46-A69D-D6F5D51C8C2C}"/>
     </a:ext>
   </a:extLst>
 </a:theme>
 </file>
 
 <file path=ppt/theme/theme2.xml><?xml version="1.0" encoding="utf-8"?>
-<a:theme xmlns:a="http://schemas.openxmlformats.org/drawingml/2006/main" name="1_양식_공청회_발표자료-총괄-양식">
+<a:theme xmlns:a="http://schemas.openxmlformats.org/drawingml/2006/main" name="Office Theme">
   <a:themeElements>
     <a:clrScheme name="Office">
       <a:dk1>
@@ -28584,16 +26891,74 @@
         <a:srgbClr val="800080"/>
       </a:folHlink>
     </a:clrScheme>
-    <a:fontScheme name="기본 디자인">
+    <a:fontScheme name="Office">
       <a:majorFont>
-        <a:latin typeface="HY견고딕"/>
-        <a:ea typeface="HY견고딕"/>
+        <a:latin typeface="Calibri"/>
+        <a:ea typeface=""/>
         <a:cs typeface=""/>
+        <a:font script="Jpan" typeface="ＭＳ Ｐゴシック"/>
+        <a:font script="Hang" typeface="맑은 고딕"/>
+        <a:font script="Hans" typeface="宋体"/>
+        <a:font script="Hant" typeface="新細明體"/>
+        <a:font script="Arab" typeface="Times New Roman"/>
+        <a:font script="Hebr" typeface="Times New Roman"/>
+        <a:font script="Thai" typeface="Angsana New"/>
+        <a:font script="Ethi" typeface="Nyala"/>
+        <a:font script="Beng" typeface="Vrinda"/>
+        <a:font script="Gujr" typeface="Shruti"/>
+        <a:font script="Khmr" typeface="MoolBoran"/>
+        <a:font script="Knda" typeface="Tunga"/>
+        <a:font script="Guru" typeface="Raavi"/>
+        <a:font script="Cans" typeface="Euphemia"/>
+        <a:font script="Cher" typeface="Plantagenet Cherokee"/>
+        <a:font script="Yiii" typeface="Microsoft Yi Baiti"/>
+        <a:font script="Tibt" typeface="Microsoft Himalaya"/>
+        <a:font script="Thaa" typeface="MV Boli"/>
+        <a:font script="Deva" typeface="Mangal"/>
+        <a:font script="Telu" typeface="Gautami"/>
+        <a:font script="Taml" typeface="Latha"/>
+        <a:font script="Syrc" typeface="Estrangelo Edessa"/>
+        <a:font script="Orya" typeface="Kalinga"/>
+        <a:font script="Mlym" typeface="Kartika"/>
+        <a:font script="Laoo" typeface="DokChampa"/>
+        <a:font script="Sinh" typeface="Iskoola Pota"/>
+        <a:font script="Mong" typeface="Mongolian Baiti"/>
+        <a:font script="Viet" typeface="Times New Roman"/>
+        <a:font script="Uigh" typeface="Microsoft Uighur"/>
       </a:majorFont>
       <a:minorFont>
-        <a:latin typeface="굴림"/>
-        <a:ea typeface="굴림"/>
+        <a:latin typeface="Calibri"/>
+        <a:ea typeface=""/>
         <a:cs typeface=""/>
+        <a:font script="Jpan" typeface="ＭＳ Ｐゴシック"/>
+        <a:font script="Hang" typeface="맑은 고딕"/>
+        <a:font script="Hans" typeface="宋体"/>
+        <a:font script="Hant" typeface="新細明體"/>
+        <a:font script="Arab" typeface="Arial"/>
+        <a:font script="Hebr" typeface="Arial"/>
+        <a:font script="Thai" typeface="Cordia New"/>
+        <a:font script="Ethi" typeface="Nyala"/>
+        <a:font script="Beng" typeface="Vrinda"/>
+        <a:font script="Gujr" typeface="Shruti"/>
+        <a:font script="Khmr" typeface="DaunPenh"/>
+        <a:font script="Knda" typeface="Tunga"/>
+        <a:font script="Guru" typeface="Raavi"/>
+        <a:font script="Cans" typeface="Euphemia"/>
+        <a:font script="Cher" typeface="Plantagenet Cherokee"/>
+        <a:font script="Yiii" typeface="Microsoft Yi Baiti"/>
+        <a:font script="Tibt" typeface="Microsoft Himalaya"/>
+        <a:font script="Thaa" typeface="MV Boli"/>
+        <a:font script="Deva" typeface="Mangal"/>
+        <a:font script="Telu" typeface="Gautami"/>
+        <a:font script="Taml" typeface="Latha"/>
+        <a:font script="Syrc" typeface="Estrangelo Edessa"/>
+        <a:font script="Orya" typeface="Kalinga"/>
+        <a:font script="Mlym" typeface="Kartika"/>
+        <a:font script="Laoo" typeface="DokChampa"/>
+        <a:font script="Sinh" typeface="Iskoola Pota"/>
+        <a:font script="Mong" typeface="Mongolian Baiti"/>
+        <a:font script="Viet" typeface="Arial"/>
+        <a:font script="Uigh" typeface="Microsoft Uighur"/>
       </a:minorFont>
     </a:fontScheme>
     <a:fmtScheme name="Office">
@@ -28628,20 +26993,16 @@
           <a:gsLst>
             <a:gs pos="0">
               <a:schemeClr val="phClr">
-                <a:shade val="51000"/>
-                <a:satMod val="130000"/>
-              </a:schemeClr>
-            </a:gs>
-            <a:gs pos="80000">
-              <a:schemeClr val="phClr">
-                <a:shade val="93000"/>
+                <a:tint val="100000"/>
+                <a:shade val="100000"/>
                 <a:satMod val="130000"/>
               </a:schemeClr>
             </a:gs>
             <a:gs pos="100000">
               <a:schemeClr val="phClr">
-                <a:shade val="94000"/>
-                <a:satMod val="135000"/>
+                <a:tint val="50000"/>
+                <a:shade val="100000"/>
+                <a:satMod val="350000"/>
               </a:schemeClr>
             </a:gs>
           </a:gsLst>
@@ -28765,37 +27126,17 @@
   </a:themeElements>
   <a:objectDefaults>
     <a:spDef>
-      <a:spPr>
-        <a:solidFill>
-          <a:schemeClr val="bg1"/>
-        </a:solidFill>
-        <a:ln w="9525">
-          <a:solidFill>
-            <a:schemeClr val="tx1"/>
-          </a:solidFill>
-        </a:ln>
-      </a:spPr>
-      <a:bodyPr lIns="252000" rtlCol="0" anchor="ctr"/>
-      <a:lstStyle>
-        <a:defPPr>
-          <a:defRPr sz="1600" dirty="0" smtClean="0">
-            <a:solidFill>
-              <a:srgbClr val="00B050"/>
-            </a:solidFill>
-            <a:latin typeface="Courier New" pitchFamily="49" charset="0"/>
-            <a:ea typeface="맑은 고딕" pitchFamily="50" charset="-127"/>
-            <a:cs typeface="Courier New" pitchFamily="49" charset="0"/>
-          </a:defRPr>
-        </a:defPPr>
-      </a:lstStyle>
+      <a:spPr/>
+      <a:bodyPr/>
+      <a:lstStyle/>
       <a:style>
-        <a:lnRef idx="3">
-          <a:schemeClr val="lt1"/>
+        <a:lnRef idx="1">
+          <a:schemeClr val="accent1"/>
         </a:lnRef>
-        <a:fillRef idx="1">
+        <a:fillRef idx="3">
           <a:schemeClr val="accent1"/>
         </a:fillRef>
-        <a:effectRef idx="1">
+        <a:effectRef idx="2">
           <a:schemeClr val="accent1"/>
         </a:effectRef>
         <a:fontRef idx="minor">
@@ -28804,24 +27145,17 @@
       </a:style>
     </a:spDef>
     <a:lnDef>
-      <a:spPr>
-        <a:ln w="12700">
-          <a:solidFill>
-            <a:schemeClr val="tx1"/>
-          </a:solidFill>
-          <a:tailEnd type="triangle"/>
-        </a:ln>
-      </a:spPr>
+      <a:spPr/>
       <a:bodyPr/>
       <a:lstStyle/>
       <a:style>
-        <a:lnRef idx="1">
+        <a:lnRef idx="2">
           <a:schemeClr val="accent1"/>
         </a:lnRef>
         <a:fillRef idx="0">
           <a:schemeClr val="accent1"/>
         </a:fillRef>
-        <a:effectRef idx="0">
+        <a:effectRef idx="1">
           <a:schemeClr val="accent1"/>
         </a:effectRef>
         <a:fontRef idx="minor">
@@ -28830,500 +27164,7 @@
       </a:style>
     </a:lnDef>
   </a:objectDefaults>
-  <a:extraClrSchemeLst>
-    <a:extraClrScheme>
-      <a:clrScheme name="기본 디자인 1">
-        <a:dk1>
-          <a:srgbClr val="000000"/>
-        </a:dk1>
-        <a:lt1>
-          <a:srgbClr val="FFFFFF"/>
-        </a:lt1>
-        <a:dk2>
-          <a:srgbClr val="000000"/>
-        </a:dk2>
-        <a:lt2>
-          <a:srgbClr val="808080"/>
-        </a:lt2>
-        <a:accent1>
-          <a:srgbClr val="BBE0E3"/>
-        </a:accent1>
-        <a:accent2>
-          <a:srgbClr val="333399"/>
-        </a:accent2>
-        <a:accent3>
-          <a:srgbClr val="FFFFFF"/>
-        </a:accent3>
-        <a:accent4>
-          <a:srgbClr val="000000"/>
-        </a:accent4>
-        <a:accent5>
-          <a:srgbClr val="DAEDEF"/>
-        </a:accent5>
-        <a:accent6>
-          <a:srgbClr val="2D2D8A"/>
-        </a:accent6>
-        <a:hlink>
-          <a:srgbClr val="009999"/>
-        </a:hlink>
-        <a:folHlink>
-          <a:srgbClr val="99CC00"/>
-        </a:folHlink>
-      </a:clrScheme>
-      <a:clrMap bg1="lt1" tx1="dk1" bg2="lt2" tx2="dk2" accent1="accent1" accent2="accent2" accent3="accent3" accent4="accent4" accent5="accent5" accent6="accent6" hlink="hlink" folHlink="folHlink"/>
-    </a:extraClrScheme>
-    <a:extraClrScheme>
-      <a:clrScheme name="기본 디자인 2">
-        <a:dk1>
-          <a:srgbClr val="000000"/>
-        </a:dk1>
-        <a:lt1>
-          <a:srgbClr val="FFFFFF"/>
-        </a:lt1>
-        <a:dk2>
-          <a:srgbClr val="000000"/>
-        </a:dk2>
-        <a:lt2>
-          <a:srgbClr val="969696"/>
-        </a:lt2>
-        <a:accent1>
-          <a:srgbClr val="FBDF53"/>
-        </a:accent1>
-        <a:accent2>
-          <a:srgbClr val="FF9966"/>
-        </a:accent2>
-        <a:accent3>
-          <a:srgbClr val="FFFFFF"/>
-        </a:accent3>
-        <a:accent4>
-          <a:srgbClr val="000000"/>
-        </a:accent4>
-        <a:accent5>
-          <a:srgbClr val="FDECB3"/>
-        </a:accent5>
-        <a:accent6>
-          <a:srgbClr val="E78A5C"/>
-        </a:accent6>
-        <a:hlink>
-          <a:srgbClr val="CC3300"/>
-        </a:hlink>
-        <a:folHlink>
-          <a:srgbClr val="996600"/>
-        </a:folHlink>
-      </a:clrScheme>
-      <a:clrMap bg1="lt1" tx1="dk1" bg2="lt2" tx2="dk2" accent1="accent1" accent2="accent2" accent3="accent3" accent4="accent4" accent5="accent5" accent6="accent6" hlink="hlink" folHlink="folHlink"/>
-    </a:extraClrScheme>
-    <a:extraClrScheme>
-      <a:clrScheme name="기본 디자인 3">
-        <a:dk1>
-          <a:srgbClr val="000000"/>
-        </a:dk1>
-        <a:lt1>
-          <a:srgbClr val="FFFFFF"/>
-        </a:lt1>
-        <a:dk2>
-          <a:srgbClr val="000000"/>
-        </a:dk2>
-        <a:lt2>
-          <a:srgbClr val="808080"/>
-        </a:lt2>
-        <a:accent1>
-          <a:srgbClr val="99CCFF"/>
-        </a:accent1>
-        <a:accent2>
-          <a:srgbClr val="CCCCFF"/>
-        </a:accent2>
-        <a:accent3>
-          <a:srgbClr val="FFFFFF"/>
-        </a:accent3>
-        <a:accent4>
-          <a:srgbClr val="000000"/>
-        </a:accent4>
-        <a:accent5>
-          <a:srgbClr val="CAE2FF"/>
-        </a:accent5>
-        <a:accent6>
-          <a:srgbClr val="B9B9E7"/>
-        </a:accent6>
-        <a:hlink>
-          <a:srgbClr val="3333CC"/>
-        </a:hlink>
-        <a:folHlink>
-          <a:srgbClr val="AF67FF"/>
-        </a:folHlink>
-      </a:clrScheme>
-      <a:clrMap bg1="lt1" tx1="dk1" bg2="lt2" tx2="dk2" accent1="accent1" accent2="accent2" accent3="accent3" accent4="accent4" accent5="accent5" accent6="accent6" hlink="hlink" folHlink="folHlink"/>
-    </a:extraClrScheme>
-    <a:extraClrScheme>
-      <a:clrScheme name="기본 디자인 4">
-        <a:dk1>
-          <a:srgbClr val="000000"/>
-        </a:dk1>
-        <a:lt1>
-          <a:srgbClr val="DEF6F1"/>
-        </a:lt1>
-        <a:dk2>
-          <a:srgbClr val="000000"/>
-        </a:dk2>
-        <a:lt2>
-          <a:srgbClr val="969696"/>
-        </a:lt2>
-        <a:accent1>
-          <a:srgbClr val="FFFFFF"/>
-        </a:accent1>
-        <a:accent2>
-          <a:srgbClr val="8DC6FF"/>
-        </a:accent2>
-        <a:accent3>
-          <a:srgbClr val="ECFAF7"/>
-        </a:accent3>
-        <a:accent4>
-          <a:srgbClr val="000000"/>
-        </a:accent4>
-        <a:accent5>
-          <a:srgbClr val="FFFFFF"/>
-        </a:accent5>
-        <a:accent6>
-          <a:srgbClr val="7FB3E7"/>
-        </a:accent6>
-        <a:hlink>
-          <a:srgbClr val="0066CC"/>
-        </a:hlink>
-        <a:folHlink>
-          <a:srgbClr val="00A800"/>
-        </a:folHlink>
-      </a:clrScheme>
-      <a:clrMap bg1="lt1" tx1="dk1" bg2="lt2" tx2="dk2" accent1="accent1" accent2="accent2" accent3="accent3" accent4="accent4" accent5="accent5" accent6="accent6" hlink="hlink" folHlink="folHlink"/>
-    </a:extraClrScheme>
-    <a:extraClrScheme>
-      <a:clrScheme name="기본 디자인 5">
-        <a:dk1>
-          <a:srgbClr val="000000"/>
-        </a:dk1>
-        <a:lt1>
-          <a:srgbClr val="FFFFD9"/>
-        </a:lt1>
-        <a:dk2>
-          <a:srgbClr val="000000"/>
-        </a:dk2>
-        <a:lt2>
-          <a:srgbClr val="777777"/>
-        </a:lt2>
-        <a:accent1>
-          <a:srgbClr val="FFFFF7"/>
-        </a:accent1>
-        <a:accent2>
-          <a:srgbClr val="33CCCC"/>
-        </a:accent2>
-        <a:accent3>
-          <a:srgbClr val="FFFFE9"/>
-        </a:accent3>
-        <a:accent4>
-          <a:srgbClr val="000000"/>
-        </a:accent4>
-        <a:accent5>
-          <a:srgbClr val="FFFFFA"/>
-        </a:accent5>
-        <a:accent6>
-          <a:srgbClr val="2DB9B9"/>
-        </a:accent6>
-        <a:hlink>
-          <a:srgbClr val="FF5050"/>
-        </a:hlink>
-        <a:folHlink>
-          <a:srgbClr val="FF9900"/>
-        </a:folHlink>
-      </a:clrScheme>
-      <a:clrMap bg1="lt1" tx1="dk1" bg2="lt2" tx2="dk2" accent1="accent1" accent2="accent2" accent3="accent3" accent4="accent4" accent5="accent5" accent6="accent6" hlink="hlink" folHlink="folHlink"/>
-    </a:extraClrScheme>
-    <a:extraClrScheme>
-      <a:clrScheme name="기본 디자인 6">
-        <a:dk1>
-          <a:srgbClr val="005A58"/>
-        </a:dk1>
-        <a:lt1>
-          <a:srgbClr val="FFFFFF"/>
-        </a:lt1>
-        <a:dk2>
-          <a:srgbClr val="008080"/>
-        </a:dk2>
-        <a:lt2>
-          <a:srgbClr val="FFFF99"/>
-        </a:lt2>
-        <a:accent1>
-          <a:srgbClr val="006462"/>
-        </a:accent1>
-        <a:accent2>
-          <a:srgbClr val="6D6FC7"/>
-        </a:accent2>
-        <a:accent3>
-          <a:srgbClr val="AAC0C0"/>
-        </a:accent3>
-        <a:accent4>
-          <a:srgbClr val="DADADA"/>
-        </a:accent4>
-        <a:accent5>
-          <a:srgbClr val="AAB8B7"/>
-        </a:accent5>
-        <a:accent6>
-          <a:srgbClr val="6264B4"/>
-        </a:accent6>
-        <a:hlink>
-          <a:srgbClr val="00FFFF"/>
-        </a:hlink>
-        <a:folHlink>
-          <a:srgbClr val="00FF00"/>
-        </a:folHlink>
-      </a:clrScheme>
-      <a:clrMap bg1="dk2" tx1="lt1" bg2="dk1" tx2="lt2" accent1="accent1" accent2="accent2" accent3="accent3" accent4="accent4" accent5="accent5" accent6="accent6" hlink="hlink" folHlink="folHlink"/>
-    </a:extraClrScheme>
-    <a:extraClrScheme>
-      <a:clrScheme name="기본 디자인 7">
-        <a:dk1>
-          <a:srgbClr val="5C1F00"/>
-        </a:dk1>
-        <a:lt1>
-          <a:srgbClr val="FFFFFF"/>
-        </a:lt1>
-        <a:dk2>
-          <a:srgbClr val="800000"/>
-        </a:dk2>
-        <a:lt2>
-          <a:srgbClr val="DFD293"/>
-        </a:lt2>
-        <a:accent1>
-          <a:srgbClr val="CC3300"/>
-        </a:accent1>
-        <a:accent2>
-          <a:srgbClr val="BE7960"/>
-        </a:accent2>
-        <a:accent3>
-          <a:srgbClr val="C0AAAA"/>
-        </a:accent3>
-        <a:accent4>
-          <a:srgbClr val="DADADA"/>
-        </a:accent4>
-        <a:accent5>
-          <a:srgbClr val="E2ADAA"/>
-        </a:accent5>
-        <a:accent6>
-          <a:srgbClr val="AC6D56"/>
-        </a:accent6>
-        <a:hlink>
-          <a:srgbClr val="FFFF99"/>
-        </a:hlink>
-        <a:folHlink>
-          <a:srgbClr val="D3A219"/>
-        </a:folHlink>
-      </a:clrScheme>
-      <a:clrMap bg1="dk2" tx1="lt1" bg2="dk1" tx2="lt2" accent1="accent1" accent2="accent2" accent3="accent3" accent4="accent4" accent5="accent5" accent6="accent6" hlink="hlink" folHlink="folHlink"/>
-    </a:extraClrScheme>
-    <a:extraClrScheme>
-      <a:clrScheme name="기본 디자인 8">
-        <a:dk1>
-          <a:srgbClr val="003366"/>
-        </a:dk1>
-        <a:lt1>
-          <a:srgbClr val="FFFFFF"/>
-        </a:lt1>
-        <a:dk2>
-          <a:srgbClr val="000099"/>
-        </a:dk2>
-        <a:lt2>
-          <a:srgbClr val="CCFFFF"/>
-        </a:lt2>
-        <a:accent1>
-          <a:srgbClr val="3366CC"/>
-        </a:accent1>
-        <a:accent2>
-          <a:srgbClr val="00B000"/>
-        </a:accent2>
-        <a:accent3>
-          <a:srgbClr val="AAAACA"/>
-        </a:accent3>
-        <a:accent4>
-          <a:srgbClr val="DADADA"/>
-        </a:accent4>
-        <a:accent5>
-          <a:srgbClr val="ADB8E2"/>
-        </a:accent5>
-        <a:accent6>
-          <a:srgbClr val="009F00"/>
-        </a:accent6>
-        <a:hlink>
-          <a:srgbClr val="66CCFF"/>
-        </a:hlink>
-        <a:folHlink>
-          <a:srgbClr val="FFE701"/>
-        </a:folHlink>
-      </a:clrScheme>
-      <a:clrMap bg1="dk2" tx1="lt1" bg2="dk1" tx2="lt2" accent1="accent1" accent2="accent2" accent3="accent3" accent4="accent4" accent5="accent5" accent6="accent6" hlink="hlink" folHlink="folHlink"/>
-    </a:extraClrScheme>
-    <a:extraClrScheme>
-      <a:clrScheme name="기본 디자인 9">
-        <a:dk1>
-          <a:srgbClr val="336699"/>
-        </a:dk1>
-        <a:lt1>
-          <a:srgbClr val="FFFFFF"/>
-        </a:lt1>
-        <a:dk2>
-          <a:srgbClr val="000000"/>
-        </a:dk2>
-        <a:lt2>
-          <a:srgbClr val="E3EBF1"/>
-        </a:lt2>
-        <a:accent1>
-          <a:srgbClr val="003399"/>
-        </a:accent1>
-        <a:accent2>
-          <a:srgbClr val="468A4B"/>
-        </a:accent2>
-        <a:accent3>
-          <a:srgbClr val="AAAAAA"/>
-        </a:accent3>
-        <a:accent4>
-          <a:srgbClr val="DADADA"/>
-        </a:accent4>
-        <a:accent5>
-          <a:srgbClr val="AAADCA"/>
-        </a:accent5>
-        <a:accent6>
-          <a:srgbClr val="3F7D43"/>
-        </a:accent6>
-        <a:hlink>
-          <a:srgbClr val="66CCFF"/>
-        </a:hlink>
-        <a:folHlink>
-          <a:srgbClr val="F0E500"/>
-        </a:folHlink>
-      </a:clrScheme>
-      <a:clrMap bg1="dk2" tx1="lt1" bg2="dk1" tx2="lt2" accent1="accent1" accent2="accent2" accent3="accent3" accent4="accent4" accent5="accent5" accent6="accent6" hlink="hlink" folHlink="folHlink"/>
-    </a:extraClrScheme>
-    <a:extraClrScheme>
-      <a:clrScheme name="기본 디자인 10">
-        <a:dk1>
-          <a:srgbClr val="777777"/>
-        </a:dk1>
-        <a:lt1>
-          <a:srgbClr val="FFFFFF"/>
-        </a:lt1>
-        <a:dk2>
-          <a:srgbClr val="686B5D"/>
-        </a:dk2>
-        <a:lt2>
-          <a:srgbClr val="D1D1CB"/>
-        </a:lt2>
-        <a:accent1>
-          <a:srgbClr val="909082"/>
-        </a:accent1>
-        <a:accent2>
-          <a:srgbClr val="809EA8"/>
-        </a:accent2>
-        <a:accent3>
-          <a:srgbClr val="B9BAB6"/>
-        </a:accent3>
-        <a:accent4>
-          <a:srgbClr val="DADADA"/>
-        </a:accent4>
-        <a:accent5>
-          <a:srgbClr val="C6C6C1"/>
-        </a:accent5>
-        <a:accent6>
-          <a:srgbClr val="738F98"/>
-        </a:accent6>
-        <a:hlink>
-          <a:srgbClr val="FFCC66"/>
-        </a:hlink>
-        <a:folHlink>
-          <a:srgbClr val="E9DCB9"/>
-        </a:folHlink>
-      </a:clrScheme>
-      <a:clrMap bg1="dk2" tx1="lt1" bg2="dk1" tx2="lt2" accent1="accent1" accent2="accent2" accent3="accent3" accent4="accent4" accent5="accent5" accent6="accent6" hlink="hlink" folHlink="folHlink"/>
-    </a:extraClrScheme>
-    <a:extraClrScheme>
-      <a:clrScheme name="기본 디자인 11">
-        <a:dk1>
-          <a:srgbClr val="3E3E5C"/>
-        </a:dk1>
-        <a:lt1>
-          <a:srgbClr val="FFFFFF"/>
-        </a:lt1>
-        <a:dk2>
-          <a:srgbClr val="666699"/>
-        </a:dk2>
-        <a:lt2>
-          <a:srgbClr val="FFFFFF"/>
-        </a:lt2>
-        <a:accent1>
-          <a:srgbClr val="60597B"/>
-        </a:accent1>
-        <a:accent2>
-          <a:srgbClr val="6666FF"/>
-        </a:accent2>
-        <a:accent3>
-          <a:srgbClr val="B8B8CA"/>
-        </a:accent3>
-        <a:accent4>
-          <a:srgbClr val="DADADA"/>
-        </a:accent4>
-        <a:accent5>
-          <a:srgbClr val="B6B5BF"/>
-        </a:accent5>
-        <a:accent6>
-          <a:srgbClr val="5C5CE7"/>
-        </a:accent6>
-        <a:hlink>
-          <a:srgbClr val="99CCFF"/>
-        </a:hlink>
-        <a:folHlink>
-          <a:srgbClr val="FFFF99"/>
-        </a:folHlink>
-      </a:clrScheme>
-      <a:clrMap bg1="dk2" tx1="lt1" bg2="dk1" tx2="lt2" accent1="accent1" accent2="accent2" accent3="accent3" accent4="accent4" accent5="accent5" accent6="accent6" hlink="hlink" folHlink="folHlink"/>
-    </a:extraClrScheme>
-    <a:extraClrScheme>
-      <a:clrScheme name="기본 디자인 12">
-        <a:dk1>
-          <a:srgbClr val="2D2015"/>
-        </a:dk1>
-        <a:lt1>
-          <a:srgbClr val="FFFFFF"/>
-        </a:lt1>
-        <a:dk2>
-          <a:srgbClr val="523E26"/>
-        </a:dk2>
-        <a:lt2>
-          <a:srgbClr val="DFC08D"/>
-        </a:lt2>
-        <a:accent1>
-          <a:srgbClr val="8C7B70"/>
-        </a:accent1>
-        <a:accent2>
-          <a:srgbClr val="8F5F2F"/>
-        </a:accent2>
-        <a:accent3>
-          <a:srgbClr val="B3AFAC"/>
-        </a:accent3>
-        <a:accent4>
-          <a:srgbClr val="DADADA"/>
-        </a:accent4>
-        <a:accent5>
-          <a:srgbClr val="C5BFBB"/>
-        </a:accent5>
-        <a:accent6>
-          <a:srgbClr val="81552A"/>
-        </a:accent6>
-        <a:hlink>
-          <a:srgbClr val="CCB400"/>
-        </a:hlink>
-        <a:folHlink>
-          <a:srgbClr val="8C9EA0"/>
-        </a:folHlink>
-      </a:clrScheme>
-      <a:clrMap bg1="dk2" tx1="lt1" bg2="dk1" tx2="lt2" accent1="accent1" accent2="accent2" accent3="accent3" accent4="accent4" accent5="accent5" accent6="accent6" hlink="hlink" folHlink="folHlink"/>
-    </a:extraClrScheme>
-  </a:extraClrSchemeLst>
+  <a:extraClrSchemeLst/>
 </a:theme>
 </file>
 
@@ -29643,322 +27484,4 @@
   </a:objectDefaults>
   <a:extraClrSchemeLst/>
 </a:theme>
-</file>
-
-<file path=ppt/theme/theme4.xml><?xml version="1.0" encoding="utf-8"?>
-<a:theme xmlns:a="http://schemas.openxmlformats.org/drawingml/2006/main" name="Office Theme">
-  <a:themeElements>
-    <a:clrScheme name="Office">
-      <a:dk1>
-        <a:sysClr val="windowText" lastClr="000000"/>
-      </a:dk1>
-      <a:lt1>
-        <a:sysClr val="window" lastClr="FFFFFF"/>
-      </a:lt1>
-      <a:dk2>
-        <a:srgbClr val="1F497D"/>
-      </a:dk2>
-      <a:lt2>
-        <a:srgbClr val="EEECE1"/>
-      </a:lt2>
-      <a:accent1>
-        <a:srgbClr val="4F81BD"/>
-      </a:accent1>
-      <a:accent2>
-        <a:srgbClr val="C0504D"/>
-      </a:accent2>
-      <a:accent3>
-        <a:srgbClr val="9BBB59"/>
-      </a:accent3>
-      <a:accent4>
-        <a:srgbClr val="8064A2"/>
-      </a:accent4>
-      <a:accent5>
-        <a:srgbClr val="4BACC6"/>
-      </a:accent5>
-      <a:accent6>
-        <a:srgbClr val="F79646"/>
-      </a:accent6>
-      <a:hlink>
-        <a:srgbClr val="0000FF"/>
-      </a:hlink>
-      <a:folHlink>
-        <a:srgbClr val="800080"/>
-      </a:folHlink>
-    </a:clrScheme>
-    <a:fontScheme name="Office">
-      <a:majorFont>
-        <a:latin typeface="Calibri"/>
-        <a:ea typeface=""/>
-        <a:cs typeface=""/>
-        <a:font script="Jpan" typeface="ＭＳ Ｐゴシック"/>
-        <a:font script="Hang" typeface="맑은 고딕"/>
-        <a:font script="Hans" typeface="宋体"/>
-        <a:font script="Hant" typeface="新細明體"/>
-        <a:font script="Arab" typeface="Times New Roman"/>
-        <a:font script="Hebr" typeface="Times New Roman"/>
-        <a:font script="Thai" typeface="Angsana New"/>
-        <a:font script="Ethi" typeface="Nyala"/>
-        <a:font script="Beng" typeface="Vrinda"/>
-        <a:font script="Gujr" typeface="Shruti"/>
-        <a:font script="Khmr" typeface="MoolBoran"/>
-        <a:font script="Knda" typeface="Tunga"/>
-        <a:font script="Guru" typeface="Raavi"/>
-        <a:font script="Cans" typeface="Euphemia"/>
-        <a:font script="Cher" typeface="Plantagenet Cherokee"/>
-        <a:font script="Yiii" typeface="Microsoft Yi Baiti"/>
-        <a:font script="Tibt" typeface="Microsoft Himalaya"/>
-        <a:font script="Thaa" typeface="MV Boli"/>
-        <a:font script="Deva" typeface="Mangal"/>
-        <a:font script="Telu" typeface="Gautami"/>
-        <a:font script="Taml" typeface="Latha"/>
-        <a:font script="Syrc" typeface="Estrangelo Edessa"/>
-        <a:font script="Orya" typeface="Kalinga"/>
-        <a:font script="Mlym" typeface="Kartika"/>
-        <a:font script="Laoo" typeface="DokChampa"/>
-        <a:font script="Sinh" typeface="Iskoola Pota"/>
-        <a:font script="Mong" typeface="Mongolian Baiti"/>
-        <a:font script="Viet" typeface="Times New Roman"/>
-        <a:font script="Uigh" typeface="Microsoft Uighur"/>
-      </a:majorFont>
-      <a:minorFont>
-        <a:latin typeface="Calibri"/>
-        <a:ea typeface=""/>
-        <a:cs typeface=""/>
-        <a:font script="Jpan" typeface="ＭＳ Ｐゴシック"/>
-        <a:font script="Hang" typeface="맑은 고딕"/>
-        <a:font script="Hans" typeface="宋体"/>
-        <a:font script="Hant" typeface="新細明體"/>
-        <a:font script="Arab" typeface="Arial"/>
-        <a:font script="Hebr" typeface="Arial"/>
-        <a:font script="Thai" typeface="Cordia New"/>
-        <a:font script="Ethi" typeface="Nyala"/>
-        <a:font script="Beng" typeface="Vrinda"/>
-        <a:font script="Gujr" typeface="Shruti"/>
-        <a:font script="Khmr" typeface="DaunPenh"/>
-        <a:font script="Knda" typeface="Tunga"/>
-        <a:font script="Guru" typeface="Raavi"/>
-        <a:font script="Cans" typeface="Euphemia"/>
-        <a:font script="Cher" typeface="Plantagenet Cherokee"/>
-        <a:font script="Yiii" typeface="Microsoft Yi Baiti"/>
-        <a:font script="Tibt" typeface="Microsoft Himalaya"/>
-        <a:font script="Thaa" typeface="MV Boli"/>
-        <a:font script="Deva" typeface="Mangal"/>
-        <a:font script="Telu" typeface="Gautami"/>
-        <a:font script="Taml" typeface="Latha"/>
-        <a:font script="Syrc" typeface="Estrangelo Edessa"/>
-        <a:font script="Orya" typeface="Kalinga"/>
-        <a:font script="Mlym" typeface="Kartika"/>
-        <a:font script="Laoo" typeface="DokChampa"/>
-        <a:font script="Sinh" typeface="Iskoola Pota"/>
-        <a:font script="Mong" typeface="Mongolian Baiti"/>
-        <a:font script="Viet" typeface="Arial"/>
-        <a:font script="Uigh" typeface="Microsoft Uighur"/>
-      </a:minorFont>
-    </a:fontScheme>
-    <a:fmtScheme name="Office">
-      <a:fillStyleLst>
-        <a:solidFill>
-          <a:schemeClr val="phClr"/>
-        </a:solidFill>
-        <a:gradFill rotWithShape="1">
-          <a:gsLst>
-            <a:gs pos="0">
-              <a:schemeClr val="phClr">
-                <a:tint val="50000"/>
-                <a:satMod val="300000"/>
-              </a:schemeClr>
-            </a:gs>
-            <a:gs pos="35000">
-              <a:schemeClr val="phClr">
-                <a:tint val="37000"/>
-                <a:satMod val="300000"/>
-              </a:schemeClr>
-            </a:gs>
-            <a:gs pos="100000">
-              <a:schemeClr val="phClr">
-                <a:tint val="15000"/>
-                <a:satMod val="350000"/>
-              </a:schemeClr>
-            </a:gs>
-          </a:gsLst>
-          <a:lin ang="16200000" scaled="1"/>
-        </a:gradFill>
-        <a:gradFill rotWithShape="1">
-          <a:gsLst>
-            <a:gs pos="0">
-              <a:schemeClr val="phClr">
-                <a:tint val="100000"/>
-                <a:shade val="100000"/>
-                <a:satMod val="130000"/>
-              </a:schemeClr>
-            </a:gs>
-            <a:gs pos="100000">
-              <a:schemeClr val="phClr">
-                <a:tint val="50000"/>
-                <a:shade val="100000"/>
-                <a:satMod val="350000"/>
-              </a:schemeClr>
-            </a:gs>
-          </a:gsLst>
-          <a:lin ang="16200000" scaled="0"/>
-        </a:gradFill>
-      </a:fillStyleLst>
-      <a:lnStyleLst>
-        <a:ln w="9525" cap="flat" cmpd="sng" algn="ctr">
-          <a:solidFill>
-            <a:schemeClr val="phClr">
-              <a:shade val="95000"/>
-              <a:satMod val="105000"/>
-            </a:schemeClr>
-          </a:solidFill>
-          <a:prstDash val="solid"/>
-        </a:ln>
-        <a:ln w="25400" cap="flat" cmpd="sng" algn="ctr">
-          <a:solidFill>
-            <a:schemeClr val="phClr"/>
-          </a:solidFill>
-          <a:prstDash val="solid"/>
-        </a:ln>
-        <a:ln w="38100" cap="flat" cmpd="sng" algn="ctr">
-          <a:solidFill>
-            <a:schemeClr val="phClr"/>
-          </a:solidFill>
-          <a:prstDash val="solid"/>
-        </a:ln>
-      </a:lnStyleLst>
-      <a:effectStyleLst>
-        <a:effectStyle>
-          <a:effectLst>
-            <a:outerShdw blurRad="40000" dist="20000" dir="5400000" rotWithShape="0">
-              <a:srgbClr val="000000">
-                <a:alpha val="38000"/>
-              </a:srgbClr>
-            </a:outerShdw>
-          </a:effectLst>
-        </a:effectStyle>
-        <a:effectStyle>
-          <a:effectLst>
-            <a:outerShdw blurRad="40000" dist="23000" dir="5400000" rotWithShape="0">
-              <a:srgbClr val="000000">
-                <a:alpha val="35000"/>
-              </a:srgbClr>
-            </a:outerShdw>
-          </a:effectLst>
-        </a:effectStyle>
-        <a:effectStyle>
-          <a:effectLst>
-            <a:outerShdw blurRad="40000" dist="23000" dir="5400000" rotWithShape="0">
-              <a:srgbClr val="000000">
-                <a:alpha val="35000"/>
-              </a:srgbClr>
-            </a:outerShdw>
-          </a:effectLst>
-          <a:scene3d>
-            <a:camera prst="orthographicFront">
-              <a:rot lat="0" lon="0" rev="0"/>
-            </a:camera>
-            <a:lightRig rig="threePt" dir="t">
-              <a:rot lat="0" lon="0" rev="1200000"/>
-            </a:lightRig>
-          </a:scene3d>
-          <a:sp3d>
-            <a:bevelT w="63500" h="25400"/>
-          </a:sp3d>
-        </a:effectStyle>
-      </a:effectStyleLst>
-      <a:bgFillStyleLst>
-        <a:solidFill>
-          <a:schemeClr val="phClr"/>
-        </a:solidFill>
-        <a:gradFill rotWithShape="1">
-          <a:gsLst>
-            <a:gs pos="0">
-              <a:schemeClr val="phClr">
-                <a:tint val="40000"/>
-                <a:satMod val="350000"/>
-              </a:schemeClr>
-            </a:gs>
-            <a:gs pos="40000">
-              <a:schemeClr val="phClr">
-                <a:tint val="45000"/>
-                <a:shade val="99000"/>
-                <a:satMod val="350000"/>
-              </a:schemeClr>
-            </a:gs>
-            <a:gs pos="100000">
-              <a:schemeClr val="phClr">
-                <a:shade val="20000"/>
-                <a:satMod val="255000"/>
-              </a:schemeClr>
-            </a:gs>
-          </a:gsLst>
-          <a:path path="circle">
-            <a:fillToRect l="50000" t="-80000" r="50000" b="180000"/>
-          </a:path>
-        </a:gradFill>
-        <a:gradFill rotWithShape="1">
-          <a:gsLst>
-            <a:gs pos="0">
-              <a:schemeClr val="phClr">
-                <a:tint val="80000"/>
-                <a:satMod val="300000"/>
-              </a:schemeClr>
-            </a:gs>
-            <a:gs pos="100000">
-              <a:schemeClr val="phClr">
-                <a:shade val="30000"/>
-                <a:satMod val="200000"/>
-              </a:schemeClr>
-            </a:gs>
-          </a:gsLst>
-          <a:path path="circle">
-            <a:fillToRect l="50000" t="50000" r="50000" b="50000"/>
-          </a:path>
-        </a:gradFill>
-      </a:bgFillStyleLst>
-    </a:fmtScheme>
-  </a:themeElements>
-  <a:objectDefaults>
-    <a:spDef>
-      <a:spPr/>
-      <a:bodyPr/>
-      <a:lstStyle/>
-      <a:style>
-        <a:lnRef idx="1">
-          <a:schemeClr val="accent1"/>
-        </a:lnRef>
-        <a:fillRef idx="3">
-          <a:schemeClr val="accent1"/>
-        </a:fillRef>
-        <a:effectRef idx="2">
-          <a:schemeClr val="accent1"/>
-        </a:effectRef>
-        <a:fontRef idx="minor">
-          <a:schemeClr val="lt1"/>
-        </a:fontRef>
-      </a:style>
-    </a:spDef>
-    <a:lnDef>
-      <a:spPr/>
-      <a:bodyPr/>
-      <a:lstStyle/>
-      <a:style>
-        <a:lnRef idx="2">
-          <a:schemeClr val="accent1"/>
-        </a:lnRef>
-        <a:fillRef idx="0">
-          <a:schemeClr val="accent1"/>
-        </a:fillRef>
-        <a:effectRef idx="1">
-          <a:schemeClr val="accent1"/>
-        </a:effectRef>
-        <a:fontRef idx="minor">
-          <a:schemeClr val="tx1"/>
-        </a:fontRef>
-      </a:style>
-    </a:lnDef>
-  </a:objectDefaults>
-  <a:extraClrSchemeLst/>
-</a:theme>
 </file>
</xml_diff>